<commit_message>
added pptx Feature engineering
</commit_message>
<xml_diff>
--- a/pptx/052_Logistic_regression.pptx
+++ b/pptx/052_Logistic_regression.pptx
@@ -234,7 +234,7 @@
           <a:p>
             <a:fld id="{7D48BAA4-CDAF-41B6-BD14-09C1104D2ABC}" type="datetimeFigureOut">
               <a:rPr lang="uk-UA" smtClean="0"/>
-              <a:t>17.12.2018</a:t>
+              <a:t>07.06.2021</a:t>
             </a:fld>
             <a:endParaRPr lang="uk-UA"/>
           </a:p>
@@ -312,7 +312,7 @@
           <a:p>
             <a:fld id="{1243F476-860B-4A65-8687-8964CAA026CE}" type="slidenum">
               <a:rPr lang="uk-UA" smtClean="0"/>
-              <a:t>‹№›</a:t>
+              <a:t>‹#›</a:t>
             </a:fld>
             <a:endParaRPr lang="uk-UA"/>
           </a:p>
@@ -411,7 +411,7 @@
           <a:p>
             <a:fld id="{8C675581-76A8-4E96-B3A5-55626BBCD851}" type="datetimeFigureOut">
               <a:rPr lang="uk-UA" smtClean="0"/>
-              <a:t>17.12.2018</a:t>
+              <a:t>07.06.2021</a:t>
             </a:fld>
             <a:endParaRPr lang="uk-UA"/>
           </a:p>
@@ -569,7 +569,7 @@
           <a:p>
             <a:fld id="{D2584530-CA7D-4354-9882-5DAFE98A5211}" type="slidenum">
               <a:rPr lang="uk-UA" smtClean="0"/>
-              <a:t>‹№›</a:t>
+              <a:t>‹#›</a:t>
             </a:fld>
             <a:endParaRPr lang="uk-UA"/>
           </a:p>
@@ -2664,7 +2664,9 @@
           <a:lstStyle/>
           <a:p>
             <a:pPr algn="ctr"/>
-            <a:endParaRPr lang="uk-UA"/>
+            <a:endParaRPr lang="uk-UA" dirty="0">
+              <a:latin typeface="Calibri" panose="020F0502020204030204" pitchFamily="34" charset="0"/>
+            </a:endParaRPr>
           </a:p>
         </p:txBody>
       </p:sp>
@@ -2716,7 +2718,9 @@
           <a:lstStyle/>
           <a:p>
             <a:pPr algn="ctr"/>
-            <a:endParaRPr lang="uk-UA"/>
+            <a:endParaRPr lang="uk-UA" dirty="0">
+              <a:latin typeface="Calibri" panose="020F0502020204030204" pitchFamily="34" charset="0"/>
+            </a:endParaRPr>
           </a:p>
         </p:txBody>
       </p:sp>
@@ -2949,7 +2953,7 @@
           <a:p>
             <a:fld id="{EE0C36BD-C101-446C-9D86-AD020CD43D83}" type="datetime1">
               <a:rPr lang="uk-UA" smtClean="0"/>
-              <a:t>17.12.2018</a:t>
+              <a:t>07.06.2021</a:t>
             </a:fld>
             <a:endParaRPr lang="uk-UA"/>
           </a:p>
@@ -2991,7 +2995,7 @@
           <a:p>
             <a:fld id="{472947FE-C0EE-4B89-BF95-BB6F5DBEA98C}" type="slidenum">
               <a:rPr lang="uk-UA" smtClean="0"/>
-              <a:t>‹№›</a:t>
+              <a:t>‹#›</a:t>
             </a:fld>
             <a:endParaRPr lang="uk-UA"/>
           </a:p>
@@ -3119,7 +3123,7 @@
           <a:p>
             <a:fld id="{9CD10D9B-B5C6-4E42-B22A-C7C4BC835DCB}" type="datetime1">
               <a:rPr lang="uk-UA" smtClean="0"/>
-              <a:t>17.12.2018</a:t>
+              <a:t>07.06.2021</a:t>
             </a:fld>
             <a:endParaRPr lang="uk-UA"/>
           </a:p>
@@ -3161,7 +3165,7 @@
           <a:p>
             <a:fld id="{472947FE-C0EE-4B89-BF95-BB6F5DBEA98C}" type="slidenum">
               <a:rPr lang="uk-UA" smtClean="0"/>
-              <a:t>‹№›</a:t>
+              <a:t>‹#›</a:t>
             </a:fld>
             <a:endParaRPr lang="uk-UA"/>
           </a:p>
@@ -3299,7 +3303,7 @@
           <a:p>
             <a:fld id="{50E852B1-E8B1-4B47-AFE5-D56B3640A3D7}" type="datetime1">
               <a:rPr lang="uk-UA" smtClean="0"/>
-              <a:t>17.12.2018</a:t>
+              <a:t>07.06.2021</a:t>
             </a:fld>
             <a:endParaRPr lang="uk-UA"/>
           </a:p>
@@ -3341,7 +3345,7 @@
           <a:p>
             <a:fld id="{472947FE-C0EE-4B89-BF95-BB6F5DBEA98C}" type="slidenum">
               <a:rPr lang="uk-UA" smtClean="0"/>
-              <a:t>‹№›</a:t>
+              <a:t>‹#›</a:t>
             </a:fld>
             <a:endParaRPr lang="uk-UA"/>
           </a:p>
@@ -3425,7 +3429,9 @@
           <a:lstStyle/>
           <a:p>
             <a:pPr marL="720000" algn="l"/>
-            <a:endParaRPr lang="uk-UA" sz="4000" dirty="0"/>
+            <a:endParaRPr lang="uk-UA" sz="4000" dirty="0">
+              <a:latin typeface="Calibri" panose="020F0502020204030204" pitchFamily="34" charset="0"/>
+            </a:endParaRPr>
           </a:p>
         </p:txBody>
       </p:sp>
@@ -3534,7 +3540,7 @@
           <a:p>
             <a:fld id="{163FEDB8-7778-449D-902C-3B3C568FAF6B}" type="datetime1">
               <a:rPr lang="uk-UA" smtClean="0"/>
-              <a:t>17.12.2018</a:t>
+              <a:t>07.06.2021</a:t>
             </a:fld>
             <a:endParaRPr lang="uk-UA" dirty="0"/>
           </a:p>
@@ -3581,7 +3587,7 @@
             <a:fld id="{472947FE-C0EE-4B89-BF95-BB6F5DBEA98C}" type="slidenum">
               <a:rPr lang="uk-UA" smtClean="0"/>
               <a:pPr/>
-              <a:t>‹№›</a:t>
+              <a:t>‹#›</a:t>
             </a:fld>
             <a:endParaRPr lang="uk-UA" dirty="0"/>
           </a:p>
@@ -3760,7 +3766,7 @@
             <a:fld id="{472947FE-C0EE-4B89-BF95-BB6F5DBEA98C}" type="slidenum">
               <a:rPr lang="uk-UA" smtClean="0"/>
               <a:pPr/>
-              <a:t>‹№›</a:t>
+              <a:t>‹#›</a:t>
             </a:fld>
             <a:endParaRPr lang="uk-UA" dirty="0"/>
           </a:p>
@@ -3814,7 +3820,9 @@
           <a:lstStyle/>
           <a:p>
             <a:pPr marL="720000" algn="l"/>
-            <a:endParaRPr lang="uk-UA" sz="4000" dirty="0"/>
+            <a:endParaRPr lang="uk-UA" sz="4000" dirty="0">
+              <a:latin typeface="Calibri" panose="020F0502020204030204" pitchFamily="34" charset="0"/>
+            </a:endParaRPr>
           </a:p>
         </p:txBody>
       </p:sp>
@@ -4069,7 +4077,9 @@
           <a:lstStyle/>
           <a:p>
             <a:pPr marL="720000" algn="l"/>
-            <a:endParaRPr lang="uk-UA" sz="4000" dirty="0"/>
+            <a:endParaRPr lang="uk-UA" sz="4000" dirty="0">
+              <a:latin typeface="Calibri" panose="020F0502020204030204" pitchFamily="34" charset="0"/>
+            </a:endParaRPr>
           </a:p>
         </p:txBody>
       </p:sp>
@@ -4178,7 +4188,7 @@
           <a:p>
             <a:fld id="{163FEDB8-7778-449D-902C-3B3C568FAF6B}" type="datetime1">
               <a:rPr lang="uk-UA" smtClean="0"/>
-              <a:t>17.12.2018</a:t>
+              <a:t>07.06.2021</a:t>
             </a:fld>
             <a:endParaRPr lang="uk-UA" dirty="0"/>
           </a:p>
@@ -4225,7 +4235,7 @@
             <a:fld id="{472947FE-C0EE-4B89-BF95-BB6F5DBEA98C}" type="slidenum">
               <a:rPr lang="uk-UA" smtClean="0"/>
               <a:pPr/>
-              <a:t>‹№›</a:t>
+              <a:t>‹#›</a:t>
             </a:fld>
             <a:endParaRPr lang="uk-UA" dirty="0"/>
           </a:p>
@@ -4339,7 +4349,9 @@
           <a:lstStyle/>
           <a:p>
             <a:pPr marL="720000" algn="l"/>
-            <a:endParaRPr lang="uk-UA" sz="4000" dirty="0"/>
+            <a:endParaRPr lang="uk-UA" sz="4000" dirty="0">
+              <a:latin typeface="Calibri" panose="020F0502020204030204" pitchFamily="34" charset="0"/>
+            </a:endParaRPr>
           </a:p>
         </p:txBody>
       </p:sp>
@@ -4523,7 +4535,9 @@
           <a:lstStyle/>
           <a:p>
             <a:pPr marL="720000" algn="l"/>
-            <a:endParaRPr lang="uk-UA" sz="4000" dirty="0"/>
+            <a:endParaRPr lang="uk-UA" sz="4000" dirty="0">
+              <a:latin typeface="Calibri" panose="020F0502020204030204" pitchFamily="34" charset="0"/>
+            </a:endParaRPr>
           </a:p>
         </p:txBody>
       </p:sp>
@@ -4637,7 +4651,7 @@
           <a:p>
             <a:fld id="{0528AECD-4A94-4327-BAD7-47806D0E69D9}" type="datetime1">
               <a:rPr lang="uk-UA" smtClean="0"/>
-              <a:t>17.12.2018</a:t>
+              <a:t>07.06.2021</a:t>
             </a:fld>
             <a:endParaRPr lang="uk-UA"/>
           </a:p>
@@ -4683,7 +4697,7 @@
           <a:p>
             <a:fld id="{472947FE-C0EE-4B89-BF95-BB6F5DBEA98C}" type="slidenum">
               <a:rPr lang="uk-UA" smtClean="0"/>
-              <a:t>‹№›</a:t>
+              <a:t>‹#›</a:t>
             </a:fld>
             <a:endParaRPr lang="uk-UA"/>
           </a:p>
@@ -4865,7 +4879,7 @@
             <a:fld id="{472947FE-C0EE-4B89-BF95-BB6F5DBEA98C}" type="slidenum">
               <a:rPr lang="uk-UA" smtClean="0"/>
               <a:pPr/>
-              <a:t>‹№›</a:t>
+              <a:t>‹#›</a:t>
             </a:fld>
             <a:endParaRPr lang="uk-UA" dirty="0"/>
           </a:p>
@@ -4919,7 +4933,9 @@
           <a:lstStyle/>
           <a:p>
             <a:pPr marL="720000" algn="l"/>
-            <a:endParaRPr lang="uk-UA" sz="4000" dirty="0"/>
+            <a:endParaRPr lang="uk-UA" sz="4000" dirty="0">
+              <a:latin typeface="Calibri" panose="020F0502020204030204" pitchFamily="34" charset="0"/>
+            </a:endParaRPr>
           </a:p>
         </p:txBody>
       </p:sp>
@@ -5144,7 +5160,9 @@
           <a:lstStyle/>
           <a:p>
             <a:pPr marL="720000" algn="l"/>
-            <a:endParaRPr lang="uk-UA" sz="4000" dirty="0"/>
+            <a:endParaRPr lang="uk-UA" sz="4000" dirty="0">
+              <a:latin typeface="Calibri" panose="020F0502020204030204" pitchFamily="34" charset="0"/>
+            </a:endParaRPr>
           </a:p>
         </p:txBody>
       </p:sp>
@@ -5376,7 +5394,7 @@
           <a:p>
             <a:fld id="{F2E8C604-772C-4D64-A8D0-7FDD12145456}" type="datetime1">
               <a:rPr lang="uk-UA" smtClean="0"/>
-              <a:t>17.12.2018</a:t>
+              <a:t>07.06.2021</a:t>
             </a:fld>
             <a:endParaRPr lang="uk-UA"/>
           </a:p>
@@ -5418,7 +5436,7 @@
           <a:p>
             <a:fld id="{472947FE-C0EE-4B89-BF95-BB6F5DBEA98C}" type="slidenum">
               <a:rPr lang="uk-UA" smtClean="0"/>
-              <a:t>‹№›</a:t>
+              <a:t>‹#›</a:t>
             </a:fld>
             <a:endParaRPr lang="uk-UA"/>
           </a:p>
@@ -5608,7 +5626,7 @@
           <a:p>
             <a:fld id="{FC5F74AB-A519-4C51-81E9-460DB6DE967E}" type="datetime1">
               <a:rPr lang="uk-UA" smtClean="0"/>
-              <a:t>17.12.2018</a:t>
+              <a:t>07.06.2021</a:t>
             </a:fld>
             <a:endParaRPr lang="uk-UA"/>
           </a:p>
@@ -5650,7 +5668,7 @@
           <a:p>
             <a:fld id="{472947FE-C0EE-4B89-BF95-BB6F5DBEA98C}" type="slidenum">
               <a:rPr lang="uk-UA" smtClean="0"/>
-              <a:t>‹№›</a:t>
+              <a:t>‹#›</a:t>
             </a:fld>
             <a:endParaRPr lang="uk-UA"/>
           </a:p>
@@ -5975,7 +5993,7 @@
           <a:p>
             <a:fld id="{6A355421-69F2-4C8A-BDA5-833AB0074E0F}" type="datetime1">
               <a:rPr lang="uk-UA" smtClean="0"/>
-              <a:t>17.12.2018</a:t>
+              <a:t>07.06.2021</a:t>
             </a:fld>
             <a:endParaRPr lang="uk-UA"/>
           </a:p>
@@ -6017,7 +6035,7 @@
           <a:p>
             <a:fld id="{472947FE-C0EE-4B89-BF95-BB6F5DBEA98C}" type="slidenum">
               <a:rPr lang="uk-UA" smtClean="0"/>
-              <a:t>‹№›</a:t>
+              <a:t>‹#›</a:t>
             </a:fld>
             <a:endParaRPr lang="uk-UA"/>
           </a:p>
@@ -6093,7 +6111,7 @@
           <a:p>
             <a:fld id="{07EFB70E-E816-4C44-B4E5-4897FB608D0D}" type="datetime1">
               <a:rPr lang="uk-UA" smtClean="0"/>
-              <a:t>17.12.2018</a:t>
+              <a:t>07.06.2021</a:t>
             </a:fld>
             <a:endParaRPr lang="uk-UA"/>
           </a:p>
@@ -6135,7 +6153,7 @@
           <a:p>
             <a:fld id="{472947FE-C0EE-4B89-BF95-BB6F5DBEA98C}" type="slidenum">
               <a:rPr lang="uk-UA" smtClean="0"/>
-              <a:t>‹№›</a:t>
+              <a:t>‹#›</a:t>
             </a:fld>
             <a:endParaRPr lang="uk-UA"/>
           </a:p>
@@ -6188,7 +6206,7 @@
           <a:p>
             <a:fld id="{F6525287-7E4A-46BA-85A8-82072F0BD0C7}" type="datetime1">
               <a:rPr lang="uk-UA" smtClean="0"/>
-              <a:t>17.12.2018</a:t>
+              <a:t>07.06.2021</a:t>
             </a:fld>
             <a:endParaRPr lang="uk-UA"/>
           </a:p>
@@ -6230,7 +6248,7 @@
           <a:p>
             <a:fld id="{472947FE-C0EE-4B89-BF95-BB6F5DBEA98C}" type="slidenum">
               <a:rPr lang="uk-UA" smtClean="0"/>
-              <a:t>‹№›</a:t>
+              <a:t>‹#›</a:t>
             </a:fld>
             <a:endParaRPr lang="uk-UA"/>
           </a:p>
@@ -6331,35 +6349,35 @@
           <a:p>
             <a:pPr lvl="0"/>
             <a:r>
-              <a:rPr lang="uk-UA"/>
+              <a:rPr lang="uk-UA" dirty="0"/>
               <a:t>Відредагуйте стиль зразка тексту</a:t>
             </a:r>
           </a:p>
           <a:p>
             <a:pPr lvl="1"/>
             <a:r>
-              <a:rPr lang="uk-UA"/>
+              <a:rPr lang="uk-UA" dirty="0"/>
               <a:t>Другий рівень</a:t>
             </a:r>
           </a:p>
           <a:p>
             <a:pPr lvl="2"/>
             <a:r>
-              <a:rPr lang="uk-UA"/>
+              <a:rPr lang="uk-UA" dirty="0"/>
               <a:t>Третій рівень</a:t>
             </a:r>
           </a:p>
           <a:p>
             <a:pPr lvl="3"/>
             <a:r>
-              <a:rPr lang="uk-UA"/>
+              <a:rPr lang="uk-UA" dirty="0"/>
               <a:t>Четвертий рівень</a:t>
             </a:r>
           </a:p>
           <a:p>
             <a:pPr lvl="4"/>
             <a:r>
-              <a:rPr lang="uk-UA"/>
+              <a:rPr lang="uk-UA" dirty="0"/>
               <a:t>П’ятий рівень</a:t>
             </a:r>
             <a:endParaRPr lang="en-US" dirty="0"/>
@@ -6395,15 +6413,17 @@
                     <a:tint val="75000"/>
                   </a:schemeClr>
                 </a:solidFill>
+                <a:latin typeface="Calibri" panose="020F0502020204030204" pitchFamily="34" charset="0"/>
               </a:defRPr>
             </a:lvl1pPr>
           </a:lstStyle>
           <a:p>
             <a:fld id="{0528AECD-4A94-4327-BAD7-47806D0E69D9}" type="datetime1">
               <a:rPr lang="uk-UA" smtClean="0"/>
-              <a:t>17.12.2018</a:t>
+              <a:pPr/>
+              <a:t>07.06.2021</a:t>
             </a:fld>
-            <a:endParaRPr lang="uk-UA"/>
+            <a:endParaRPr lang="uk-UA" dirty="0"/>
           </a:p>
         </p:txBody>
       </p:sp>
@@ -6436,11 +6456,12 @@
                     <a:tint val="75000"/>
                   </a:schemeClr>
                 </a:solidFill>
+                <a:latin typeface="Calibri" panose="020F0502020204030204" pitchFamily="34" charset="0"/>
               </a:defRPr>
             </a:lvl1pPr>
           </a:lstStyle>
           <a:p>
-            <a:endParaRPr lang="uk-UA"/>
+            <a:endParaRPr lang="uk-UA" dirty="0"/>
           </a:p>
         </p:txBody>
       </p:sp>
@@ -6473,15 +6494,17 @@
                     <a:tint val="75000"/>
                   </a:schemeClr>
                 </a:solidFill>
+                <a:latin typeface="Calibri" panose="020F0502020204030204" pitchFamily="34" charset="0"/>
               </a:defRPr>
             </a:lvl1pPr>
           </a:lstStyle>
           <a:p>
             <a:fld id="{472947FE-C0EE-4B89-BF95-BB6F5DBEA98C}" type="slidenum">
               <a:rPr lang="uk-UA" smtClean="0"/>
-              <a:t>‹№›</a:t>
+              <a:pPr/>
+              <a:t>‹#›</a:t>
             </a:fld>
-            <a:endParaRPr lang="uk-UA"/>
+            <a:endParaRPr lang="uk-UA" dirty="0"/>
           </a:p>
         </p:txBody>
       </p:sp>
@@ -6524,7 +6547,7 @@
           <a:solidFill>
             <a:schemeClr val="tx1"/>
           </a:solidFill>
-          <a:latin typeface="+mj-lt"/>
+          <a:latin typeface="Calibri" panose="020F0502020204030204" pitchFamily="34" charset="0"/>
           <a:ea typeface="+mj-ea"/>
           <a:cs typeface="+mj-cs"/>
         </a:defRPr>
@@ -6544,7 +6567,7 @@
           <a:solidFill>
             <a:schemeClr val="tx1"/>
           </a:solidFill>
-          <a:latin typeface="+mn-lt"/>
+          <a:latin typeface="Calibri" panose="020F0502020204030204" pitchFamily="34" charset="0"/>
           <a:ea typeface="+mn-ea"/>
           <a:cs typeface="+mn-cs"/>
         </a:defRPr>
@@ -6562,7 +6585,7 @@
           <a:solidFill>
             <a:schemeClr val="tx1"/>
           </a:solidFill>
-          <a:latin typeface="+mn-lt"/>
+          <a:latin typeface="Calibri" panose="020F0502020204030204" pitchFamily="34" charset="0"/>
           <a:ea typeface="+mn-ea"/>
           <a:cs typeface="+mn-cs"/>
         </a:defRPr>
@@ -6580,7 +6603,7 @@
           <a:solidFill>
             <a:schemeClr val="tx1"/>
           </a:solidFill>
-          <a:latin typeface="+mn-lt"/>
+          <a:latin typeface="Calibri" panose="020F0502020204030204" pitchFamily="34" charset="0"/>
           <a:ea typeface="+mn-ea"/>
           <a:cs typeface="+mn-cs"/>
         </a:defRPr>
@@ -6598,7 +6621,7 @@
           <a:solidFill>
             <a:schemeClr val="tx1"/>
           </a:solidFill>
-          <a:latin typeface="+mn-lt"/>
+          <a:latin typeface="Calibri" panose="020F0502020204030204" pitchFamily="34" charset="0"/>
           <a:ea typeface="+mn-ea"/>
           <a:cs typeface="+mn-cs"/>
         </a:defRPr>
@@ -6616,7 +6639,7 @@
           <a:solidFill>
             <a:schemeClr val="tx1"/>
           </a:solidFill>
-          <a:latin typeface="+mn-lt"/>
+          <a:latin typeface="Calibri" panose="020F0502020204030204" pitchFamily="34" charset="0"/>
           <a:ea typeface="+mn-ea"/>
           <a:cs typeface="+mn-cs"/>
         </a:defRPr>
@@ -7144,6 +7167,7 @@
                 <a:solidFill>
                   <a:srgbClr val="000000"/>
                 </a:solidFill>
+                <a:latin typeface="Calibri" panose="020F0502020204030204" pitchFamily="34" charset="0"/>
               </a:rPr>
               <a:t>Клебан Ю.В.</a:t>
             </a:r>
@@ -7348,6 +7372,7 @@
                 <a:solidFill>
                   <a:srgbClr val="000000"/>
                 </a:solidFill>
+                <a:latin typeface="Calibri" panose="020F0502020204030204" pitchFamily="34" charset="0"/>
               </a:rPr>
               <a:t>м. Київ, 2018</a:t>
             </a:r>
@@ -7633,6 +7658,7 @@
                 <a:solidFill>
                   <a:srgbClr val="000000"/>
                 </a:solidFill>
+                <a:latin typeface="Calibri" panose="020F0502020204030204" pitchFamily="34" charset="0"/>
               </a:rPr>
               <a:t>+</a:t>
             </a:r>
@@ -7640,6 +7666,7 @@
               <a:solidFill>
                 <a:srgbClr val="000000"/>
               </a:solidFill>
+              <a:latin typeface="Calibri" panose="020F0502020204030204" pitchFamily="34" charset="0"/>
             </a:endParaRPr>
           </a:p>
         </p:txBody>
@@ -7867,7 +7894,9 @@
                     <a:p>
                       <a:pPr algn="ctr"/>
                       <a:r>
-                        <a:rPr lang="uk-UA" sz="1400" dirty="0"/>
+                        <a:rPr lang="uk-UA" sz="1400" dirty="0">
+                          <a:latin typeface="Calibri" panose="020F0502020204030204" pitchFamily="34" charset="0"/>
+                        </a:rPr>
                         <a:t>№</a:t>
                       </a:r>
                     </a:p>
@@ -7881,7 +7910,9 @@
                     <a:p>
                       <a:pPr algn="ctr"/>
                       <a:r>
-                        <a:rPr lang="en-US" sz="1400" dirty="0"/>
+                        <a:rPr lang="en-US" sz="1400" dirty="0">
+                          <a:latin typeface="Calibri" panose="020F0502020204030204" pitchFamily="34" charset="0"/>
+                        </a:rPr>
                         <a:t>Predicted</a:t>
                       </a:r>
                     </a:p>
@@ -7910,7 +7941,9 @@
                     <a:p>
                       <a:pPr algn="ctr"/>
                       <a:r>
-                        <a:rPr lang="en-US" sz="1400" dirty="0"/>
+                        <a:rPr lang="en-US" sz="1400" dirty="0">
+                          <a:latin typeface="Calibri" panose="020F0502020204030204" pitchFamily="34" charset="0"/>
+                        </a:rPr>
                         <a:t>1</a:t>
                       </a:r>
                       <a:endParaRPr lang="uk-UA" sz="1400" dirty="0"/>
@@ -7925,7 +7958,9 @@
                     <a:p>
                       <a:pPr algn="ctr"/>
                       <a:r>
-                        <a:rPr lang="en-US" sz="1400" dirty="0"/>
+                        <a:rPr lang="en-US" sz="1400" dirty="0">
+                          <a:latin typeface="Calibri" panose="020F0502020204030204" pitchFamily="34" charset="0"/>
+                        </a:rPr>
                         <a:t>0,85</a:t>
                       </a:r>
                       <a:endParaRPr lang="uk-UA" sz="1400" dirty="0"/>
@@ -7947,7 +7982,9 @@
                     <a:p>
                       <a:pPr algn="ctr"/>
                       <a:r>
-                        <a:rPr lang="en-US" sz="1400" dirty="0"/>
+                        <a:rPr lang="en-US" sz="1400" dirty="0">
+                          <a:latin typeface="Calibri" panose="020F0502020204030204" pitchFamily="34" charset="0"/>
+                        </a:rPr>
                         <a:t>2</a:t>
                       </a:r>
                       <a:endParaRPr lang="uk-UA" sz="1400" dirty="0"/>
@@ -7962,7 +7999,9 @@
                     <a:p>
                       <a:pPr algn="ctr"/>
                       <a:r>
-                        <a:rPr lang="en-US" sz="1400" dirty="0"/>
+                        <a:rPr lang="en-US" sz="1400" dirty="0">
+                          <a:latin typeface="Calibri" panose="020F0502020204030204" pitchFamily="34" charset="0"/>
+                        </a:rPr>
                         <a:t>0,46</a:t>
                       </a:r>
                       <a:endParaRPr lang="uk-UA" sz="1400" dirty="0"/>
@@ -7984,7 +8023,9 @@
                     <a:p>
                       <a:pPr algn="ctr"/>
                       <a:r>
-                        <a:rPr lang="en-US" sz="1400" dirty="0"/>
+                        <a:rPr lang="en-US" sz="1400" dirty="0">
+                          <a:latin typeface="Calibri" panose="020F0502020204030204" pitchFamily="34" charset="0"/>
+                        </a:rPr>
                         <a:t>3</a:t>
                       </a:r>
                       <a:endParaRPr lang="uk-UA" sz="1400" dirty="0"/>
@@ -7999,7 +8040,9 @@
                     <a:p>
                       <a:pPr algn="ctr"/>
                       <a:r>
-                        <a:rPr lang="en-US" sz="1400" dirty="0"/>
+                        <a:rPr lang="en-US" sz="1400" dirty="0">
+                          <a:latin typeface="Calibri" panose="020F0502020204030204" pitchFamily="34" charset="0"/>
+                        </a:rPr>
                         <a:t>0,12</a:t>
                       </a:r>
                       <a:endParaRPr lang="uk-UA" sz="1400" dirty="0"/>
@@ -8021,7 +8064,9 @@
                     <a:p>
                       <a:pPr algn="ctr"/>
                       <a:r>
-                        <a:rPr lang="en-US" sz="1400" dirty="0"/>
+                        <a:rPr lang="en-US" sz="1400" dirty="0">
+                          <a:latin typeface="Calibri" panose="020F0502020204030204" pitchFamily="34" charset="0"/>
+                        </a:rPr>
                         <a:t>4</a:t>
                       </a:r>
                       <a:endParaRPr lang="uk-UA" sz="1400" dirty="0"/>
@@ -8036,7 +8081,9 @@
                     <a:p>
                       <a:pPr algn="ctr"/>
                       <a:r>
-                        <a:rPr lang="en-US" sz="1400" dirty="0"/>
+                        <a:rPr lang="en-US" sz="1400" dirty="0">
+                          <a:latin typeface="Calibri" panose="020F0502020204030204" pitchFamily="34" charset="0"/>
+                        </a:rPr>
                         <a:t>0,47</a:t>
                       </a:r>
                       <a:endParaRPr lang="uk-UA" sz="1400" dirty="0"/>
@@ -8058,7 +8105,9 @@
                     <a:p>
                       <a:pPr algn="ctr"/>
                       <a:r>
-                        <a:rPr lang="en-US" sz="1400" dirty="0"/>
+                        <a:rPr lang="en-US" sz="1400" dirty="0">
+                          <a:latin typeface="Calibri" panose="020F0502020204030204" pitchFamily="34" charset="0"/>
+                        </a:rPr>
                         <a:t>5</a:t>
                       </a:r>
                       <a:endParaRPr lang="uk-UA" sz="1400" dirty="0"/>
@@ -8073,7 +8122,9 @@
                     <a:p>
                       <a:pPr algn="ctr"/>
                       <a:r>
-                        <a:rPr lang="en-US" sz="1400" dirty="0"/>
+                        <a:rPr lang="en-US" sz="1400" dirty="0">
+                          <a:latin typeface="Calibri" panose="020F0502020204030204" pitchFamily="34" charset="0"/>
+                        </a:rPr>
                         <a:t>0,67</a:t>
                       </a:r>
                       <a:endParaRPr lang="uk-UA" sz="1400" dirty="0"/>
@@ -8095,7 +8146,9 @@
                     <a:p>
                       <a:pPr algn="ctr"/>
                       <a:r>
-                        <a:rPr lang="en-US" sz="1400" dirty="0"/>
+                        <a:rPr lang="en-US" sz="1400" dirty="0">
+                          <a:latin typeface="Calibri" panose="020F0502020204030204" pitchFamily="34" charset="0"/>
+                        </a:rPr>
                         <a:t>6</a:t>
                       </a:r>
                       <a:endParaRPr lang="uk-UA" sz="1400" dirty="0"/>
@@ -8110,7 +8163,9 @@
                     <a:p>
                       <a:pPr algn="ctr"/>
                       <a:r>
-                        <a:rPr lang="en-US" sz="1400" dirty="0"/>
+                        <a:rPr lang="en-US" sz="1400" dirty="0">
+                          <a:latin typeface="Calibri" panose="020F0502020204030204" pitchFamily="34" charset="0"/>
+                        </a:rPr>
                         <a:t>0,22</a:t>
                       </a:r>
                       <a:endParaRPr lang="uk-UA" sz="1400" dirty="0"/>
@@ -8182,7 +8237,9 @@
                     <a:p>
                       <a:pPr algn="ctr"/>
                       <a:r>
-                        <a:rPr lang="uk-UA" sz="1400" dirty="0"/>
+                        <a:rPr lang="uk-UA" sz="1400" dirty="0">
+                          <a:latin typeface="Calibri" panose="020F0502020204030204" pitchFamily="34" charset="0"/>
+                        </a:rPr>
                         <a:t>№</a:t>
                       </a:r>
                     </a:p>
@@ -8196,7 +8253,9 @@
                     <a:p>
                       <a:pPr algn="ctr"/>
                       <a:r>
-                        <a:rPr lang="en-US" sz="1400" dirty="0"/>
+                        <a:rPr lang="en-US" sz="1400" dirty="0">
+                          <a:latin typeface="Calibri" panose="020F0502020204030204" pitchFamily="34" charset="0"/>
+                        </a:rPr>
                         <a:t>Default</a:t>
                       </a:r>
                     </a:p>
@@ -8225,7 +8284,9 @@
                     <a:p>
                       <a:pPr algn="ctr"/>
                       <a:r>
-                        <a:rPr lang="en-US" sz="1400" dirty="0"/>
+                        <a:rPr lang="en-US" sz="1400" dirty="0">
+                          <a:latin typeface="Calibri" panose="020F0502020204030204" pitchFamily="34" charset="0"/>
+                        </a:rPr>
                         <a:t>1</a:t>
                       </a:r>
                       <a:endParaRPr lang="uk-UA" sz="1400" dirty="0"/>
@@ -8240,7 +8301,9 @@
                     <a:p>
                       <a:pPr algn="ctr"/>
                       <a:r>
-                        <a:rPr lang="en-US" sz="1400" dirty="0"/>
+                        <a:rPr lang="en-US" sz="1400" dirty="0">
+                          <a:latin typeface="Calibri" panose="020F0502020204030204" pitchFamily="34" charset="0"/>
+                        </a:rPr>
                         <a:t>1</a:t>
                       </a:r>
                       <a:endParaRPr lang="uk-UA" sz="1400" dirty="0"/>
@@ -8262,7 +8325,9 @@
                     <a:p>
                       <a:pPr algn="ctr"/>
                       <a:r>
-                        <a:rPr lang="en-US" sz="1400" dirty="0"/>
+                        <a:rPr lang="en-US" sz="1400" dirty="0">
+                          <a:latin typeface="Calibri" panose="020F0502020204030204" pitchFamily="34" charset="0"/>
+                        </a:rPr>
                         <a:t>2</a:t>
                       </a:r>
                       <a:endParaRPr lang="uk-UA" sz="1400" dirty="0"/>
@@ -8277,7 +8342,9 @@
                     <a:p>
                       <a:pPr algn="ctr"/>
                       <a:r>
-                        <a:rPr lang="en-US" sz="1400" dirty="0"/>
+                        <a:rPr lang="en-US" sz="1400" dirty="0">
+                          <a:latin typeface="Calibri" panose="020F0502020204030204" pitchFamily="34" charset="0"/>
+                        </a:rPr>
                         <a:t>0</a:t>
                       </a:r>
                       <a:endParaRPr lang="uk-UA" sz="1400" dirty="0"/>
@@ -8299,7 +8366,9 @@
                     <a:p>
                       <a:pPr algn="ctr"/>
                       <a:r>
-                        <a:rPr lang="en-US" sz="1400" dirty="0"/>
+                        <a:rPr lang="en-US" sz="1400" dirty="0">
+                          <a:latin typeface="Calibri" panose="020F0502020204030204" pitchFamily="34" charset="0"/>
+                        </a:rPr>
                         <a:t>3</a:t>
                       </a:r>
                       <a:endParaRPr lang="uk-UA" sz="1400" dirty="0"/>
@@ -8314,7 +8383,9 @@
                     <a:p>
                       <a:pPr algn="ctr"/>
                       <a:r>
-                        <a:rPr lang="en-US" sz="1400" dirty="0"/>
+                        <a:rPr lang="en-US" sz="1400" dirty="0">
+                          <a:latin typeface="Calibri" panose="020F0502020204030204" pitchFamily="34" charset="0"/>
+                        </a:rPr>
                         <a:t>0</a:t>
                       </a:r>
                       <a:endParaRPr lang="uk-UA" sz="1400" dirty="0"/>
@@ -8336,7 +8407,9 @@
                     <a:p>
                       <a:pPr algn="ctr"/>
                       <a:r>
-                        <a:rPr lang="en-US" sz="1400" dirty="0"/>
+                        <a:rPr lang="en-US" sz="1400" dirty="0">
+                          <a:latin typeface="Calibri" panose="020F0502020204030204" pitchFamily="34" charset="0"/>
+                        </a:rPr>
                         <a:t>4</a:t>
                       </a:r>
                       <a:endParaRPr lang="uk-UA" sz="1400" dirty="0"/>
@@ -8351,7 +8424,9 @@
                     <a:p>
                       <a:pPr algn="ctr"/>
                       <a:r>
-                        <a:rPr lang="en-US" sz="1400" dirty="0"/>
+                        <a:rPr lang="en-US" sz="1400" dirty="0">
+                          <a:latin typeface="Calibri" panose="020F0502020204030204" pitchFamily="34" charset="0"/>
+                        </a:rPr>
                         <a:t>0</a:t>
                       </a:r>
                       <a:endParaRPr lang="uk-UA" sz="1400" dirty="0"/>
@@ -8373,7 +8448,9 @@
                     <a:p>
                       <a:pPr algn="ctr"/>
                       <a:r>
-                        <a:rPr lang="en-US" sz="1400" dirty="0"/>
+                        <a:rPr lang="en-US" sz="1400" dirty="0">
+                          <a:latin typeface="Calibri" panose="020F0502020204030204" pitchFamily="34" charset="0"/>
+                        </a:rPr>
                         <a:t>5</a:t>
                       </a:r>
                       <a:endParaRPr lang="uk-UA" sz="1400" dirty="0"/>
@@ -8388,7 +8465,9 @@
                     <a:p>
                       <a:pPr algn="ctr"/>
                       <a:r>
-                        <a:rPr lang="en-US" sz="1400" dirty="0"/>
+                        <a:rPr lang="en-US" sz="1400" dirty="0">
+                          <a:latin typeface="Calibri" panose="020F0502020204030204" pitchFamily="34" charset="0"/>
+                        </a:rPr>
                         <a:t>1</a:t>
                       </a:r>
                       <a:endParaRPr lang="uk-UA" sz="1400" dirty="0"/>
@@ -8410,7 +8489,9 @@
                     <a:p>
                       <a:pPr algn="ctr"/>
                       <a:r>
-                        <a:rPr lang="en-US" sz="1400" dirty="0"/>
+                        <a:rPr lang="en-US" sz="1400" dirty="0">
+                          <a:latin typeface="Calibri" panose="020F0502020204030204" pitchFamily="34" charset="0"/>
+                        </a:rPr>
                         <a:t>6</a:t>
                       </a:r>
                       <a:endParaRPr lang="uk-UA" sz="1400" dirty="0"/>
@@ -8425,7 +8506,9 @@
                     <a:p>
                       <a:pPr algn="ctr"/>
                       <a:r>
-                        <a:rPr lang="en-US" sz="1400" dirty="0"/>
+                        <a:rPr lang="en-US" sz="1400" dirty="0">
+                          <a:latin typeface="Calibri" panose="020F0502020204030204" pitchFamily="34" charset="0"/>
+                        </a:rPr>
                         <a:t>0</a:t>
                       </a:r>
                       <a:endParaRPr lang="uk-UA" sz="1400" dirty="0"/>
@@ -8485,7 +8568,9 @@
           <a:lstStyle/>
           <a:p>
             <a:pPr algn="ctr"/>
-            <a:endParaRPr lang="uk-UA"/>
+            <a:endParaRPr lang="uk-UA" dirty="0">
+              <a:latin typeface="Calibri" panose="020F0502020204030204" pitchFamily="34" charset="0"/>
+            </a:endParaRPr>
           </a:p>
         </p:txBody>
       </p:sp>
@@ -8686,14 +8771,20 @@
               <a:buNone/>
             </a:pPr>
             <a:r>
-              <a:rPr lang="uk-UA" sz="2400" dirty="0"/>
+              <a:rPr lang="uk-UA" sz="2400" dirty="0">
+                <a:latin typeface="Calibri" panose="020F0502020204030204" pitchFamily="34" charset="0"/>
+              </a:rPr>
               <a:t>Приклад трансформації імовірностей до класів 0 і 1 у </a:t>
             </a:r>
             <a:r>
-              <a:rPr lang="en-US" sz="2400" dirty="0"/>
+              <a:rPr lang="en-US" sz="2400" dirty="0">
+                <a:latin typeface="Calibri" panose="020F0502020204030204" pitchFamily="34" charset="0"/>
+              </a:rPr>
               <a:t>R:</a:t>
             </a:r>
-            <a:endParaRPr lang="uk-UA" sz="2400" dirty="0"/>
+            <a:endParaRPr lang="uk-UA" sz="2400" dirty="0">
+              <a:latin typeface="Calibri" panose="020F0502020204030204" pitchFamily="34" charset="0"/>
+            </a:endParaRPr>
           </a:p>
         </p:txBody>
       </p:sp>
@@ -8747,9 +8838,9 @@
         <p:grpSpPr>
           <a:xfrm>
             <a:off x="2608446" y="1035819"/>
-            <a:ext cx="3900067" cy="2404725"/>
+            <a:ext cx="3900067" cy="2378118"/>
             <a:chOff x="2608446" y="1035819"/>
-            <a:chExt cx="3900067" cy="2404725"/>
+            <a:chExt cx="3900067" cy="2378118"/>
           </a:xfrm>
         </p:grpSpPr>
         <p:grpSp>
@@ -8767,9 +8858,9 @@
           <p:grpSpPr>
             <a:xfrm>
               <a:off x="2608446" y="1035819"/>
-              <a:ext cx="3900067" cy="2404725"/>
+              <a:ext cx="3900067" cy="2378118"/>
               <a:chOff x="2608446" y="1035819"/>
-              <a:chExt cx="3900067" cy="2404725"/>
+              <a:chExt cx="3900067" cy="2378118"/>
             </a:xfrm>
           </p:grpSpPr>
           <p:grpSp>
@@ -8787,9 +8878,9 @@
             <p:grpSpPr>
               <a:xfrm>
                 <a:off x="2608446" y="1035819"/>
-                <a:ext cx="3900067" cy="2404725"/>
+                <a:ext cx="3900067" cy="2378118"/>
                 <a:chOff x="2992127" y="1063404"/>
-                <a:chExt cx="3900067" cy="2404725"/>
+                <a:chExt cx="3900067" cy="2378118"/>
               </a:xfrm>
             </p:grpSpPr>
             <p:grpSp>
@@ -8807,9 +8898,9 @@
               <p:grpSpPr>
                 <a:xfrm>
                   <a:off x="2992127" y="1063404"/>
-                  <a:ext cx="3900067" cy="2404725"/>
+                  <a:ext cx="3900067" cy="2378118"/>
                   <a:chOff x="6008893" y="3754649"/>
-                  <a:chExt cx="4570618" cy="2818178"/>
+                  <a:chExt cx="4570618" cy="2786996"/>
                 </a:xfrm>
               </p:grpSpPr>
               <p:sp>
@@ -8914,7 +9005,9 @@
                   <a:lstStyle/>
                   <a:p>
                     <a:pPr algn="ctr"/>
-                    <a:endParaRPr lang="uk-UA"/>
+                    <a:endParaRPr lang="uk-UA" dirty="0">
+                      <a:latin typeface="Calibri" panose="020F0502020204030204" pitchFamily="34" charset="0"/>
+                    </a:endParaRPr>
                   </a:p>
                 </p:txBody>
               </p:sp>
@@ -8933,9 +9026,9 @@
                 <p:grpSpPr>
                   <a:xfrm>
                     <a:off x="6008893" y="3754649"/>
-                    <a:ext cx="4570618" cy="2818178"/>
+                    <a:ext cx="4570618" cy="2786996"/>
                     <a:chOff x="6096000" y="2816119"/>
-                    <a:chExt cx="4570618" cy="2818178"/>
+                    <a:chExt cx="4570618" cy="2786996"/>
                   </a:xfrm>
                 </p:grpSpPr>
                 <p:cxnSp>
@@ -9112,7 +9205,9 @@
                     <a:lstStyle/>
                     <a:p>
                       <a:pPr algn="ctr"/>
-                      <a:endParaRPr lang="uk-UA"/>
+                      <a:endParaRPr lang="uk-UA" dirty="0">
+                        <a:latin typeface="Calibri" panose="020F0502020204030204" pitchFamily="34" charset="0"/>
+                      </a:endParaRPr>
                     </a:p>
                   </p:txBody>
                 </p:sp>
@@ -9158,7 +9253,9 @@
                     <a:lstStyle/>
                     <a:p>
                       <a:pPr algn="ctr"/>
-                      <a:endParaRPr lang="uk-UA"/>
+                      <a:endParaRPr lang="uk-UA" dirty="0">
+                        <a:latin typeface="Calibri" panose="020F0502020204030204" pitchFamily="34" charset="0"/>
+                      </a:endParaRPr>
                     </a:p>
                   </p:txBody>
                 </p:sp>
@@ -9204,7 +9301,9 @@
                     <a:lstStyle/>
                     <a:p>
                       <a:pPr algn="ctr"/>
-                      <a:endParaRPr lang="uk-UA"/>
+                      <a:endParaRPr lang="uk-UA" dirty="0">
+                        <a:latin typeface="Calibri" panose="020F0502020204030204" pitchFamily="34" charset="0"/>
+                      </a:endParaRPr>
                     </a:p>
                   </p:txBody>
                 </p:sp>
@@ -9250,7 +9349,9 @@
                     <a:lstStyle/>
                     <a:p>
                       <a:pPr algn="ctr"/>
-                      <a:endParaRPr lang="uk-UA"/>
+                      <a:endParaRPr lang="uk-UA" dirty="0">
+                        <a:latin typeface="Calibri" panose="020F0502020204030204" pitchFamily="34" charset="0"/>
+                      </a:endParaRPr>
                     </a:p>
                   </p:txBody>
                 </p:sp>
@@ -9296,7 +9397,9 @@
                     <a:lstStyle/>
                     <a:p>
                       <a:pPr algn="ctr"/>
-                      <a:endParaRPr lang="uk-UA"/>
+                      <a:endParaRPr lang="uk-UA" dirty="0">
+                        <a:latin typeface="Calibri" panose="020F0502020204030204" pitchFamily="34" charset="0"/>
+                      </a:endParaRPr>
                     </a:p>
                   </p:txBody>
                 </p:sp>
@@ -9342,7 +9445,9 @@
                     <a:lstStyle/>
                     <a:p>
                       <a:pPr algn="ctr"/>
-                      <a:endParaRPr lang="uk-UA"/>
+                      <a:endParaRPr lang="uk-UA" dirty="0">
+                        <a:latin typeface="Calibri" panose="020F0502020204030204" pitchFamily="34" charset="0"/>
+                      </a:endParaRPr>
                     </a:p>
                   </p:txBody>
                 </p:sp>
@@ -9388,7 +9493,9 @@
                     <a:lstStyle/>
                     <a:p>
                       <a:pPr algn="ctr"/>
-                      <a:endParaRPr lang="uk-UA"/>
+                      <a:endParaRPr lang="uk-UA" dirty="0">
+                        <a:latin typeface="Calibri" panose="020F0502020204030204" pitchFamily="34" charset="0"/>
+                      </a:endParaRPr>
                     </a:p>
                   </p:txBody>
                 </p:sp>
@@ -9434,7 +9541,9 @@
                     <a:lstStyle/>
                     <a:p>
                       <a:pPr algn="ctr"/>
-                      <a:endParaRPr lang="uk-UA"/>
+                      <a:endParaRPr lang="uk-UA" dirty="0">
+                        <a:latin typeface="Calibri" panose="020F0502020204030204" pitchFamily="34" charset="0"/>
+                      </a:endParaRPr>
                     </a:p>
                   </p:txBody>
                 </p:sp>
@@ -9480,7 +9589,9 @@
                     <a:lstStyle/>
                     <a:p>
                       <a:pPr algn="ctr"/>
-                      <a:endParaRPr lang="uk-UA"/>
+                      <a:endParaRPr lang="uk-UA" dirty="0">
+                        <a:latin typeface="Calibri" panose="020F0502020204030204" pitchFamily="34" charset="0"/>
+                      </a:endParaRPr>
                     </a:p>
                   </p:txBody>
                 </p:sp>
@@ -9526,7 +9637,9 @@
                     <a:lstStyle/>
                     <a:p>
                       <a:pPr algn="ctr"/>
-                      <a:endParaRPr lang="uk-UA"/>
+                      <a:endParaRPr lang="uk-UA" dirty="0">
+                        <a:latin typeface="Calibri" panose="020F0502020204030204" pitchFamily="34" charset="0"/>
+                      </a:endParaRPr>
                     </a:p>
                   </p:txBody>
                 </p:sp>
@@ -9572,7 +9685,9 @@
                     <a:lstStyle/>
                     <a:p>
                       <a:pPr algn="ctr"/>
-                      <a:endParaRPr lang="uk-UA"/>
+                      <a:endParaRPr lang="uk-UA" dirty="0">
+                        <a:latin typeface="Calibri" panose="020F0502020204030204" pitchFamily="34" charset="0"/>
+                      </a:endParaRPr>
                     </a:p>
                   </p:txBody>
                 </p:sp>
@@ -9618,7 +9733,9 @@
                     <a:lstStyle/>
                     <a:p>
                       <a:pPr algn="ctr"/>
-                      <a:endParaRPr lang="uk-UA"/>
+                      <a:endParaRPr lang="uk-UA" dirty="0">
+                        <a:latin typeface="Calibri" panose="020F0502020204030204" pitchFamily="34" charset="0"/>
+                      </a:endParaRPr>
                     </a:p>
                   </p:txBody>
                 </p:sp>
@@ -9664,7 +9781,9 @@
                     <a:lstStyle/>
                     <a:p>
                       <a:pPr algn="ctr"/>
-                      <a:endParaRPr lang="uk-UA"/>
+                      <a:endParaRPr lang="uk-UA" dirty="0">
+                        <a:latin typeface="Calibri" panose="020F0502020204030204" pitchFamily="34" charset="0"/>
+                      </a:endParaRPr>
                     </a:p>
                   </p:txBody>
                 </p:sp>
@@ -9710,7 +9829,9 @@
                     <a:lstStyle/>
                     <a:p>
                       <a:pPr algn="ctr"/>
-                      <a:endParaRPr lang="uk-UA"/>
+                      <a:endParaRPr lang="uk-UA" dirty="0">
+                        <a:latin typeface="Calibri" panose="020F0502020204030204" pitchFamily="34" charset="0"/>
+                      </a:endParaRPr>
                     </a:p>
                   </p:txBody>
                 </p:sp>
@@ -9756,7 +9877,9 @@
                     <a:lstStyle/>
                     <a:p>
                       <a:pPr algn="ctr"/>
-                      <a:endParaRPr lang="uk-UA"/>
+                      <a:endParaRPr lang="uk-UA" dirty="0">
+                        <a:latin typeface="Calibri" panose="020F0502020204030204" pitchFamily="34" charset="0"/>
+                      </a:endParaRPr>
                     </a:p>
                   </p:txBody>
                 </p:sp>
@@ -9802,7 +9925,9 @@
                     <a:lstStyle/>
                     <a:p>
                       <a:pPr algn="ctr"/>
-                      <a:endParaRPr lang="uk-UA"/>
+                      <a:endParaRPr lang="uk-UA" dirty="0">
+                        <a:latin typeface="Calibri" panose="020F0502020204030204" pitchFamily="34" charset="0"/>
+                      </a:endParaRPr>
                     </a:p>
                   </p:txBody>
                 </p:sp>
@@ -9848,7 +9973,9 @@
                     <a:lstStyle/>
                     <a:p>
                       <a:pPr algn="ctr"/>
-                      <a:endParaRPr lang="uk-UA"/>
+                      <a:endParaRPr lang="uk-UA" dirty="0">
+                        <a:latin typeface="Calibri" panose="020F0502020204030204" pitchFamily="34" charset="0"/>
+                      </a:endParaRPr>
                     </a:p>
                   </p:txBody>
                 </p:sp>
@@ -9894,7 +10021,9 @@
                     <a:lstStyle/>
                     <a:p>
                       <a:pPr algn="ctr"/>
-                      <a:endParaRPr lang="uk-UA"/>
+                      <a:endParaRPr lang="uk-UA" dirty="0">
+                        <a:latin typeface="Calibri" panose="020F0502020204030204" pitchFamily="34" charset="0"/>
+                      </a:endParaRPr>
                     </a:p>
                   </p:txBody>
                 </p:sp>
@@ -9940,7 +10069,9 @@
                     <a:lstStyle/>
                     <a:p>
                       <a:pPr algn="ctr"/>
-                      <a:endParaRPr lang="uk-UA"/>
+                      <a:endParaRPr lang="uk-UA" dirty="0">
+                        <a:latin typeface="Calibri" panose="020F0502020204030204" pitchFamily="34" charset="0"/>
+                      </a:endParaRPr>
                     </a:p>
                   </p:txBody>
                 </p:sp>
@@ -9986,7 +10117,9 @@
                     <a:lstStyle/>
                     <a:p>
                       <a:pPr algn="ctr"/>
-                      <a:endParaRPr lang="uk-UA"/>
+                      <a:endParaRPr lang="uk-UA" dirty="0">
+                        <a:latin typeface="Calibri" panose="020F0502020204030204" pitchFamily="34" charset="0"/>
+                      </a:endParaRPr>
                     </a:p>
                   </p:txBody>
                 </p:sp>
@@ -10032,7 +10165,9 @@
                     <a:lstStyle/>
                     <a:p>
                       <a:pPr algn="ctr"/>
-                      <a:endParaRPr lang="uk-UA"/>
+                      <a:endParaRPr lang="uk-UA" dirty="0">
+                        <a:latin typeface="Calibri" panose="020F0502020204030204" pitchFamily="34" charset="0"/>
+                      </a:endParaRPr>
                     </a:p>
                   </p:txBody>
                 </p:sp>
@@ -10078,7 +10213,9 @@
                     <a:lstStyle/>
                     <a:p>
                       <a:pPr algn="ctr"/>
-                      <a:endParaRPr lang="uk-UA"/>
+                      <a:endParaRPr lang="uk-UA" dirty="0">
+                        <a:latin typeface="Calibri" panose="020F0502020204030204" pitchFamily="34" charset="0"/>
+                      </a:endParaRPr>
                     </a:p>
                   </p:txBody>
                 </p:sp>
@@ -10124,7 +10261,9 @@
                     <a:lstStyle/>
                     <a:p>
                       <a:pPr algn="ctr"/>
-                      <a:endParaRPr lang="uk-UA"/>
+                      <a:endParaRPr lang="uk-UA" dirty="0">
+                        <a:latin typeface="Calibri" panose="020F0502020204030204" pitchFamily="34" charset="0"/>
+                      </a:endParaRPr>
                     </a:p>
                   </p:txBody>
                 </p:sp>
@@ -10170,7 +10309,9 @@
                     <a:lstStyle/>
                     <a:p>
                       <a:pPr algn="ctr"/>
-                      <a:endParaRPr lang="uk-UA"/>
+                      <a:endParaRPr lang="uk-UA" dirty="0">
+                        <a:latin typeface="Calibri" panose="020F0502020204030204" pitchFamily="34" charset="0"/>
+                      </a:endParaRPr>
                     </a:p>
                   </p:txBody>
                 </p:sp>
@@ -10216,7 +10357,9 @@
                     <a:lstStyle/>
                     <a:p>
                       <a:pPr algn="ctr"/>
-                      <a:endParaRPr lang="uk-UA"/>
+                      <a:endParaRPr lang="uk-UA" dirty="0">
+                        <a:latin typeface="Calibri" panose="020F0502020204030204" pitchFamily="34" charset="0"/>
+                      </a:endParaRPr>
                     </a:p>
                   </p:txBody>
                 </p:sp>
@@ -10235,7 +10378,7 @@
                   <p:spPr>
                     <a:xfrm>
                       <a:off x="6096000" y="2856085"/>
-                      <a:ext cx="751142" cy="355806"/>
+                      <a:ext cx="751142" cy="324624"/>
                     </a:xfrm>
                     <a:prstGeom prst="rect">
                       <a:avLst/>
@@ -10250,10 +10393,14 @@
                     <a:p>
                       <a:pPr algn="r"/>
                       <a:r>
-                        <a:rPr lang="en-US" sz="1200" dirty="0"/>
+                        <a:rPr lang="en-US" sz="1200" dirty="0">
+                          <a:latin typeface="Calibri" panose="020F0502020204030204" pitchFamily="34" charset="0"/>
+                        </a:rPr>
                         <a:t>y=1</a:t>
                       </a:r>
-                      <a:endParaRPr lang="uk-UA" sz="1200" dirty="0"/>
+                      <a:endParaRPr lang="uk-UA" sz="1200" dirty="0">
+                        <a:latin typeface="Calibri" panose="020F0502020204030204" pitchFamily="34" charset="0"/>
+                      </a:endParaRPr>
                     </a:p>
                   </p:txBody>
                 </p:sp>
@@ -10272,7 +10419,7 @@
                   <p:spPr>
                     <a:xfrm>
                       <a:off x="6096000" y="4913763"/>
-                      <a:ext cx="751142" cy="355806"/>
+                      <a:ext cx="751142" cy="324624"/>
                     </a:xfrm>
                     <a:prstGeom prst="rect">
                       <a:avLst/>
@@ -10287,10 +10434,14 @@
                     <a:p>
                       <a:pPr algn="r"/>
                       <a:r>
-                        <a:rPr lang="en-US" sz="1200" dirty="0"/>
+                        <a:rPr lang="en-US" sz="1200" dirty="0">
+                          <a:latin typeface="Calibri" panose="020F0502020204030204" pitchFamily="34" charset="0"/>
+                        </a:rPr>
                         <a:t>y=0</a:t>
                       </a:r>
-                      <a:endParaRPr lang="uk-UA" sz="1200" dirty="0"/>
+                      <a:endParaRPr lang="uk-UA" sz="1200" dirty="0">
+                        <a:latin typeface="Calibri" panose="020F0502020204030204" pitchFamily="34" charset="0"/>
+                      </a:endParaRPr>
                     </a:p>
                   </p:txBody>
                 </p:sp>
@@ -10309,7 +10460,7 @@
                   <p:spPr>
                     <a:xfrm>
                       <a:off x="6885193" y="5278491"/>
-                      <a:ext cx="3686174" cy="355806"/>
+                      <a:ext cx="3686174" cy="324624"/>
                     </a:xfrm>
                     <a:prstGeom prst="rect">
                       <a:avLst/>
@@ -10328,6 +10479,7 @@
                           <a:solidFill>
                             <a:srgbClr val="000000"/>
                           </a:solidFill>
+                          <a:latin typeface="Calibri" panose="020F0502020204030204" pitchFamily="34" charset="0"/>
                         </a:rPr>
                         <a:t>X</a:t>
                       </a:r>
@@ -10335,6 +10487,7 @@
                         <a:solidFill>
                           <a:srgbClr val="000000"/>
                         </a:solidFill>
+                        <a:latin typeface="Calibri" panose="020F0502020204030204" pitchFamily="34" charset="0"/>
                       </a:endParaRPr>
                     </a:p>
                   </p:txBody>
@@ -10354,7 +10507,7 @@
                   <p:spPr>
                     <a:xfrm>
                       <a:off x="6096000" y="3821253"/>
-                      <a:ext cx="751142" cy="355806"/>
+                      <a:ext cx="751142" cy="324624"/>
                     </a:xfrm>
                     <a:prstGeom prst="rect">
                       <a:avLst/>
@@ -10369,10 +10522,14 @@
                     <a:p>
                       <a:pPr algn="r"/>
                       <a:r>
-                        <a:rPr lang="en-US" sz="1200" dirty="0"/>
+                        <a:rPr lang="en-US" sz="1200" dirty="0">
+                          <a:latin typeface="Calibri" panose="020F0502020204030204" pitchFamily="34" charset="0"/>
+                        </a:rPr>
                         <a:t>y=0,5</a:t>
                       </a:r>
-                      <a:endParaRPr lang="uk-UA" sz="1200" dirty="0"/>
+                      <a:endParaRPr lang="uk-UA" sz="1200" dirty="0">
+                        <a:latin typeface="Calibri" panose="020F0502020204030204" pitchFamily="34" charset="0"/>
+                      </a:endParaRPr>
                     </a:p>
                   </p:txBody>
                 </p:sp>
@@ -10410,6 +10567,7 @@
                           <a:solidFill>
                             <a:srgbClr val="000000"/>
                           </a:solidFill>
+                          <a:latin typeface="Calibri" panose="020F0502020204030204" pitchFamily="34" charset="0"/>
                         </a:rPr>
                         <a:t>Cut-off = 0,5</a:t>
                       </a:r>
@@ -10417,6 +10575,7 @@
                         <a:solidFill>
                           <a:srgbClr val="000000"/>
                         </a:solidFill>
+                        <a:latin typeface="Calibri" panose="020F0502020204030204" pitchFamily="34" charset="0"/>
                       </a:endParaRPr>
                     </a:p>
                   </p:txBody>
@@ -11142,7 +11301,9 @@
                         </a:spcAft>
                       </a:pPr>
                       <a:r>
-                        <a:rPr lang="en-US" sz="2000" dirty="0"/>
+                        <a:rPr lang="en-US" sz="2000" dirty="0">
+                          <a:latin typeface="Calibri" panose="020F0502020204030204" pitchFamily="34" charset="0"/>
+                        </a:rPr>
                         <a:t>n = 200</a:t>
                       </a:r>
                       <a:endParaRPr lang="uk-UA" sz="2000" dirty="0"/>
@@ -11164,7 +11325,9 @@
                         </a:spcAft>
                       </a:pPr>
                       <a:r>
-                        <a:rPr lang="uk-UA" sz="2000" b="0" dirty="0"/>
+                        <a:rPr lang="uk-UA" sz="2000" b="0" dirty="0">
+                          <a:latin typeface="Calibri" panose="020F0502020204030204" pitchFamily="34" charset="0"/>
+                        </a:rPr>
                         <a:t>Прогнозовані</a:t>
                       </a:r>
                       <a:r>
@@ -11194,7 +11357,9 @@
                         </a:spcAft>
                       </a:pPr>
                       <a:r>
-                        <a:rPr lang="uk-UA" sz="2000" b="0" dirty="0"/>
+                        <a:rPr lang="uk-UA" sz="2000" b="0" dirty="0">
+                          <a:latin typeface="Calibri" panose="020F0502020204030204" pitchFamily="34" charset="0"/>
+                        </a:rPr>
                         <a:t>Прогнозовані</a:t>
                       </a:r>
                       <a:r>
@@ -11227,7 +11392,9 @@
                         </a:spcAft>
                       </a:pPr>
                       <a:r>
-                        <a:rPr lang="uk-UA" sz="2000" b="0" dirty="0"/>
+                        <a:rPr lang="uk-UA" sz="2000" b="0" dirty="0">
+                          <a:latin typeface="Calibri" panose="020F0502020204030204" pitchFamily="34" charset="0"/>
+                        </a:rPr>
                         <a:t>Реальні </a:t>
                       </a:r>
                       <a:r>
@@ -11253,7 +11420,9 @@
                         </a:spcAft>
                       </a:pPr>
                       <a:r>
-                        <a:rPr lang="uk-UA" sz="2000" b="1" dirty="0"/>
+                        <a:rPr lang="uk-UA" sz="2000" b="1" dirty="0">
+                          <a:latin typeface="Calibri" panose="020F0502020204030204" pitchFamily="34" charset="0"/>
+                        </a:rPr>
                         <a:t>78</a:t>
                       </a:r>
                     </a:p>
@@ -11274,7 +11443,9 @@
                         </a:spcAft>
                       </a:pPr>
                       <a:r>
-                        <a:rPr lang="uk-UA" sz="2000" b="1" dirty="0"/>
+                        <a:rPr lang="uk-UA" sz="2000" b="1" dirty="0">
+                          <a:latin typeface="Calibri" panose="020F0502020204030204" pitchFamily="34" charset="0"/>
+                        </a:rPr>
                         <a:t>14</a:t>
                       </a:r>
                     </a:p>
@@ -11302,7 +11473,9 @@
                         </a:spcAft>
                       </a:pPr>
                       <a:r>
-                        <a:rPr lang="uk-UA" sz="2000" b="0" dirty="0"/>
+                        <a:rPr lang="uk-UA" sz="2000" b="0" dirty="0">
+                          <a:latin typeface="Calibri" panose="020F0502020204030204" pitchFamily="34" charset="0"/>
+                        </a:rPr>
                         <a:t>Реальні </a:t>
                       </a:r>
                       <a:r>
@@ -11328,7 +11501,9 @@
                         </a:spcAft>
                       </a:pPr>
                       <a:r>
-                        <a:rPr lang="uk-UA" sz="2000" b="1" dirty="0"/>
+                        <a:rPr lang="uk-UA" sz="2000" b="1" dirty="0">
+                          <a:latin typeface="Calibri" panose="020F0502020204030204" pitchFamily="34" charset="0"/>
+                        </a:rPr>
                         <a:t>25</a:t>
                       </a:r>
                     </a:p>
@@ -11349,7 +11524,9 @@
                         </a:spcAft>
                       </a:pPr>
                       <a:r>
-                        <a:rPr lang="en-US" sz="2000" b="1" dirty="0"/>
+                        <a:rPr lang="en-US" sz="2000" b="1" dirty="0">
+                          <a:latin typeface="Calibri" panose="020F0502020204030204" pitchFamily="34" charset="0"/>
+                        </a:rPr>
                         <a:t>83</a:t>
                       </a:r>
                       <a:endParaRPr lang="uk-UA" sz="2000" b="1" dirty="0"/>
@@ -11564,26 +11741,38 @@
               <a:buNone/>
             </a:pPr>
             <a:r>
-              <a:rPr lang="uk-UA" sz="2400" dirty="0"/>
+              <a:rPr lang="uk-UA" sz="2400" dirty="0">
+                <a:latin typeface="Calibri" panose="020F0502020204030204" pitchFamily="34" charset="0"/>
+              </a:rPr>
               <a:t>Матриця </a:t>
             </a:r>
             <a:r>
-              <a:rPr lang="uk-UA" sz="2400" dirty="0" err="1"/>
+              <a:rPr lang="uk-UA" sz="2400" dirty="0" err="1">
+                <a:latin typeface="Calibri" panose="020F0502020204030204" pitchFamily="34" charset="0"/>
+              </a:rPr>
               <a:t>неточностей</a:t>
             </a:r>
             <a:r>
-              <a:rPr lang="en-US" sz="2400" dirty="0"/>
+              <a:rPr lang="en-US" sz="2400" dirty="0">
+                <a:latin typeface="Calibri" panose="020F0502020204030204" pitchFamily="34" charset="0"/>
+              </a:rPr>
               <a:t> </a:t>
             </a:r>
             <a:r>
-              <a:rPr lang="uk-UA" sz="2400" dirty="0"/>
+              <a:rPr lang="uk-UA" sz="2400" dirty="0">
+                <a:latin typeface="Calibri" panose="020F0502020204030204" pitchFamily="34" charset="0"/>
+              </a:rPr>
               <a:t>дозволяє оцінити якість класифікації для тестових даних, по яких відомі реальні дані вихідного параметра.</a:t>
             </a:r>
             <a:r>
-              <a:rPr lang="en-US" sz="2400" dirty="0"/>
+              <a:rPr lang="en-US" sz="2400" dirty="0">
+                <a:latin typeface="Calibri" panose="020F0502020204030204" pitchFamily="34" charset="0"/>
+              </a:rPr>
               <a:t> </a:t>
             </a:r>
-            <a:endParaRPr lang="uk-UA" sz="2400" dirty="0"/>
+            <a:endParaRPr lang="uk-UA" sz="2400" dirty="0">
+              <a:latin typeface="Calibri" panose="020F0502020204030204" pitchFamily="34" charset="0"/>
+            </a:endParaRPr>
           </a:p>
         </p:txBody>
       </p:sp>
@@ -11787,7 +11976,9 @@
               <a:buNone/>
             </a:pPr>
             <a:r>
-              <a:rPr lang="en-US" sz="2000" dirty="0"/>
+              <a:rPr lang="en-US" sz="2000" dirty="0">
+                <a:latin typeface="Calibri" panose="020F0502020204030204" pitchFamily="34" charset="0"/>
+              </a:rPr>
               <a:t>NO = Negative test = FALSE = 0</a:t>
             </a:r>
           </a:p>
@@ -11800,10 +11991,14 @@
               <a:buNone/>
             </a:pPr>
             <a:r>
-              <a:rPr lang="en-US" sz="2000" dirty="0"/>
+              <a:rPr lang="en-US" sz="2000" dirty="0">
+                <a:latin typeface="Calibri" panose="020F0502020204030204" pitchFamily="34" charset="0"/>
+              </a:rPr>
               <a:t>YES = Positive test = TRUE = 1</a:t>
             </a:r>
-            <a:endParaRPr lang="uk-UA" sz="2000" dirty="0"/>
+            <a:endParaRPr lang="uk-UA" sz="2000" dirty="0">
+              <a:latin typeface="Calibri" panose="020F0502020204030204" pitchFamily="34" charset="0"/>
+            </a:endParaRPr>
           </a:p>
         </p:txBody>
       </p:sp>
@@ -12038,7 +12233,9 @@
                         </a:spcAft>
                       </a:pPr>
                       <a:r>
-                        <a:rPr lang="en-US" sz="2000" dirty="0"/>
+                        <a:rPr lang="en-US" sz="2000" dirty="0">
+                          <a:latin typeface="Calibri" panose="020F0502020204030204" pitchFamily="34" charset="0"/>
+                        </a:rPr>
                         <a:t>n = 200</a:t>
                       </a:r>
                       <a:endParaRPr lang="uk-UA" sz="2000" dirty="0"/>
@@ -12060,7 +12257,9 @@
                         </a:spcAft>
                       </a:pPr>
                       <a:r>
-                        <a:rPr lang="uk-UA" sz="2000" b="0" dirty="0"/>
+                        <a:rPr lang="uk-UA" sz="2000" b="0" dirty="0">
+                          <a:latin typeface="Calibri" panose="020F0502020204030204" pitchFamily="34" charset="0"/>
+                        </a:rPr>
                         <a:t>Прогнозовані</a:t>
                       </a:r>
                       <a:r>
@@ -12090,7 +12289,9 @@
                         </a:spcAft>
                       </a:pPr>
                       <a:r>
-                        <a:rPr lang="uk-UA" sz="2000" b="0" dirty="0"/>
+                        <a:rPr lang="uk-UA" sz="2000" b="0" dirty="0">
+                          <a:latin typeface="Calibri" panose="020F0502020204030204" pitchFamily="34" charset="0"/>
+                        </a:rPr>
                         <a:t>Прогнозовані</a:t>
                       </a:r>
                       <a:r>
@@ -12115,7 +12316,9 @@
                           <a:spcPts val="600"/>
                         </a:spcAft>
                       </a:pPr>
-                      <a:endParaRPr lang="uk-UA" sz="2000" dirty="0"/>
+                      <a:endParaRPr lang="uk-UA" sz="2000" dirty="0">
+                        <a:latin typeface="Calibri" panose="020F0502020204030204" pitchFamily="34" charset="0"/>
+                      </a:endParaRPr>
                     </a:p>
                   </a:txBody>
                   <a:tcPr anchor="ctr"/>
@@ -12141,7 +12344,9 @@
                         </a:spcAft>
                       </a:pPr>
                       <a:r>
-                        <a:rPr lang="uk-UA" sz="2000" b="0" dirty="0"/>
+                        <a:rPr lang="uk-UA" sz="2000" b="0" dirty="0">
+                          <a:latin typeface="Calibri" panose="020F0502020204030204" pitchFamily="34" charset="0"/>
+                        </a:rPr>
                         <a:t>Реальні </a:t>
                       </a:r>
                       <a:r>
@@ -12167,7 +12372,9 @@
                         </a:spcAft>
                       </a:pPr>
                       <a:r>
-                        <a:rPr lang="en-US" sz="2000" b="1" dirty="0"/>
+                        <a:rPr lang="en-US" sz="2000" b="1" dirty="0">
+                          <a:latin typeface="Calibri" panose="020F0502020204030204" pitchFamily="34" charset="0"/>
+                        </a:rPr>
                         <a:t>TN </a:t>
                       </a:r>
                       <a:r>
@@ -12196,7 +12403,9 @@
                         </a:spcAft>
                       </a:pPr>
                       <a:r>
-                        <a:rPr lang="en-US" sz="2000" b="1" dirty="0"/>
+                        <a:rPr lang="en-US" sz="2000" b="1" dirty="0">
+                          <a:latin typeface="Calibri" panose="020F0502020204030204" pitchFamily="34" charset="0"/>
+                        </a:rPr>
                         <a:t>FP </a:t>
                       </a:r>
                       <a:r>
@@ -12225,7 +12434,9 @@
                         </a:spcAft>
                       </a:pPr>
                       <a:r>
-                        <a:rPr lang="en-US" sz="2000" b="0" dirty="0"/>
+                        <a:rPr lang="en-US" sz="2000" b="0" dirty="0">
+                          <a:latin typeface="Calibri" panose="020F0502020204030204" pitchFamily="34" charset="0"/>
+                        </a:rPr>
                         <a:t>92</a:t>
                       </a:r>
                       <a:endParaRPr lang="uk-UA" sz="2000" b="0" dirty="0"/>
@@ -12254,7 +12465,9 @@
                         </a:spcAft>
                       </a:pPr>
                       <a:r>
-                        <a:rPr lang="uk-UA" sz="2000" b="0" dirty="0"/>
+                        <a:rPr lang="uk-UA" sz="2000" b="0" dirty="0">
+                          <a:latin typeface="Calibri" panose="020F0502020204030204" pitchFamily="34" charset="0"/>
+                        </a:rPr>
                         <a:t>Реальні </a:t>
                       </a:r>
                       <a:r>
@@ -12280,7 +12493,9 @@
                         </a:spcAft>
                       </a:pPr>
                       <a:r>
-                        <a:rPr lang="en-US" sz="2000" b="1" dirty="0"/>
+                        <a:rPr lang="en-US" sz="2000" b="1" dirty="0">
+                          <a:latin typeface="Calibri" panose="020F0502020204030204" pitchFamily="34" charset="0"/>
+                        </a:rPr>
                         <a:t>FN </a:t>
                       </a:r>
                       <a:r>
@@ -12309,7 +12524,9 @@
                         </a:spcAft>
                       </a:pPr>
                       <a:r>
-                        <a:rPr lang="en-US" sz="2000" b="1" dirty="0"/>
+                        <a:rPr lang="en-US" sz="2000" b="1" dirty="0">
+                          <a:latin typeface="Calibri" panose="020F0502020204030204" pitchFamily="34" charset="0"/>
+                        </a:rPr>
                         <a:t>TP </a:t>
                       </a:r>
                       <a:r>
@@ -12335,7 +12552,9 @@
                         </a:spcAft>
                       </a:pPr>
                       <a:r>
-                        <a:rPr lang="en-US" sz="2000" b="0" dirty="0"/>
+                        <a:rPr lang="en-US" sz="2000" b="0" dirty="0">
+                          <a:latin typeface="Calibri" panose="020F0502020204030204" pitchFamily="34" charset="0"/>
+                        </a:rPr>
                         <a:t>108</a:t>
                       </a:r>
                       <a:endParaRPr lang="uk-UA" sz="2000" b="0" dirty="0"/>
@@ -12363,7 +12582,9 @@
                           <a:spcPts val="600"/>
                         </a:spcAft>
                       </a:pPr>
-                      <a:endParaRPr lang="uk-UA" sz="2000" b="1" dirty="0"/>
+                      <a:endParaRPr lang="uk-UA" sz="2000" b="1" dirty="0">
+                        <a:latin typeface="Calibri" panose="020F0502020204030204" pitchFamily="34" charset="0"/>
+                      </a:endParaRPr>
                     </a:p>
                   </a:txBody>
                   <a:tcPr anchor="ctr"/>
@@ -12382,7 +12603,9 @@
                         </a:spcAft>
                       </a:pPr>
                       <a:r>
-                        <a:rPr lang="en-US" sz="2000" b="0" dirty="0"/>
+                        <a:rPr lang="en-US" sz="2000" b="0" dirty="0">
+                          <a:latin typeface="Calibri" panose="020F0502020204030204" pitchFamily="34" charset="0"/>
+                        </a:rPr>
                         <a:t>103</a:t>
                       </a:r>
                       <a:endParaRPr lang="uk-UA" sz="2000" b="0" dirty="0"/>
@@ -12404,7 +12627,9 @@
                         </a:spcAft>
                       </a:pPr>
                       <a:r>
-                        <a:rPr lang="en-US" sz="2000" b="0" dirty="0"/>
+                        <a:rPr lang="en-US" sz="2000" b="0" dirty="0">
+                          <a:latin typeface="Calibri" panose="020F0502020204030204" pitchFamily="34" charset="0"/>
+                        </a:rPr>
                         <a:t>97</a:t>
                       </a:r>
                       <a:endParaRPr lang="uk-UA" sz="2000" b="0" dirty="0"/>
@@ -12425,7 +12650,9 @@
                           <a:spcPts val="600"/>
                         </a:spcAft>
                       </a:pPr>
-                      <a:endParaRPr lang="uk-UA" sz="2000" b="0" dirty="0"/>
+                      <a:endParaRPr lang="uk-UA" sz="2000" b="0" dirty="0">
+                        <a:latin typeface="Calibri" panose="020F0502020204030204" pitchFamily="34" charset="0"/>
+                      </a:endParaRPr>
                     </a:p>
                   </a:txBody>
                   <a:tcPr anchor="ctr"/>
@@ -12640,7 +12867,9 @@
               <a:buNone/>
             </a:pPr>
             <a:r>
-              <a:rPr lang="en-US" sz="2400" dirty="0"/>
+              <a:rPr lang="en-US" sz="2400" dirty="0">
+                <a:latin typeface="Calibri" panose="020F0502020204030204" pitchFamily="34" charset="0"/>
+              </a:rPr>
               <a:t>TP – TRUE POSITIVE</a:t>
             </a:r>
           </a:p>
@@ -12652,7 +12881,9 @@
               <a:buNone/>
             </a:pPr>
             <a:r>
-              <a:rPr lang="en-US" sz="2400" dirty="0"/>
+              <a:rPr lang="en-US" sz="2400" dirty="0">
+                <a:latin typeface="Calibri" panose="020F0502020204030204" pitchFamily="34" charset="0"/>
+              </a:rPr>
               <a:t>TN – TRUE NEGATIVE</a:t>
             </a:r>
           </a:p>
@@ -12664,7 +12895,9 @@
               <a:buNone/>
             </a:pPr>
             <a:r>
-              <a:rPr lang="en-US" sz="2400" dirty="0"/>
+              <a:rPr lang="en-US" sz="2400" dirty="0">
+                <a:latin typeface="Calibri" panose="020F0502020204030204" pitchFamily="34" charset="0"/>
+              </a:rPr>
               <a:t>FP – FALSE POSITIVE </a:t>
             </a:r>
             <a:r>
@@ -12672,6 +12905,7 @@
                 <a:solidFill>
                   <a:srgbClr val="FF0000"/>
                 </a:solidFill>
+                <a:latin typeface="Calibri" panose="020F0502020204030204" pitchFamily="34" charset="0"/>
               </a:rPr>
               <a:t>(</a:t>
             </a:r>
@@ -12680,6 +12914,7 @@
                 <a:solidFill>
                   <a:srgbClr val="FF0000"/>
                 </a:solidFill>
+                <a:latin typeface="Calibri" panose="020F0502020204030204" pitchFamily="34" charset="0"/>
               </a:rPr>
               <a:t>Помилка</a:t>
             </a:r>
@@ -12688,6 +12923,7 @@
                 <a:solidFill>
                   <a:srgbClr val="FF0000"/>
                 </a:solidFill>
+                <a:latin typeface="Calibri" panose="020F0502020204030204" pitchFamily="34" charset="0"/>
               </a:rPr>
               <a:t> 1-го типу</a:t>
             </a:r>
@@ -12696,6 +12932,7 @@
                 <a:solidFill>
                   <a:srgbClr val="FF0000"/>
                 </a:solidFill>
+                <a:latin typeface="Calibri" panose="020F0502020204030204" pitchFamily="34" charset="0"/>
               </a:rPr>
               <a:t>)</a:t>
             </a:r>
@@ -12708,11 +12945,15 @@
               <a:buNone/>
             </a:pPr>
             <a:r>
-              <a:rPr lang="en-US" sz="2400" dirty="0"/>
+              <a:rPr lang="en-US" sz="2400" dirty="0">
+                <a:latin typeface="Calibri" panose="020F0502020204030204" pitchFamily="34" charset="0"/>
+              </a:rPr>
               <a:t>FN – FALSE NEGATIVE</a:t>
             </a:r>
             <a:r>
-              <a:rPr lang="ru-RU" sz="2400" dirty="0"/>
+              <a:rPr lang="ru-RU" sz="2400" dirty="0">
+                <a:latin typeface="Calibri" panose="020F0502020204030204" pitchFamily="34" charset="0"/>
+              </a:rPr>
               <a:t> </a:t>
             </a:r>
             <a:r>
@@ -12720,6 +12961,7 @@
                 <a:solidFill>
                   <a:srgbClr val="FF0000"/>
                 </a:solidFill>
+                <a:latin typeface="Calibri" panose="020F0502020204030204" pitchFamily="34" charset="0"/>
               </a:rPr>
               <a:t>(</a:t>
             </a:r>
@@ -12728,6 +12970,7 @@
                 <a:solidFill>
                   <a:srgbClr val="FF0000"/>
                 </a:solidFill>
+                <a:latin typeface="Calibri" panose="020F0502020204030204" pitchFamily="34" charset="0"/>
               </a:rPr>
               <a:t>Помилка</a:t>
             </a:r>
@@ -12736,6 +12979,7 @@
                 <a:solidFill>
                   <a:srgbClr val="FF0000"/>
                 </a:solidFill>
+                <a:latin typeface="Calibri" panose="020F0502020204030204" pitchFamily="34" charset="0"/>
               </a:rPr>
               <a:t> 2-го типу</a:t>
             </a:r>
@@ -12744,10 +12988,13 @@
                 <a:solidFill>
                   <a:srgbClr val="FF0000"/>
                 </a:solidFill>
+                <a:latin typeface="Calibri" panose="020F0502020204030204" pitchFamily="34" charset="0"/>
               </a:rPr>
               <a:t>)</a:t>
             </a:r>
-            <a:endParaRPr lang="en-US" sz="2400" dirty="0"/>
+            <a:endParaRPr lang="en-US" sz="2400" dirty="0">
+              <a:latin typeface="Calibri" panose="020F0502020204030204" pitchFamily="34" charset="0"/>
+            </a:endParaRPr>
           </a:p>
           <a:p>
             <a:pPr marL="0" indent="0">
@@ -12757,7 +13004,9 @@
               <a:buFont typeface="Arial" panose="020B0604020202020204" pitchFamily="34" charset="0"/>
               <a:buNone/>
             </a:pPr>
-            <a:endParaRPr lang="uk-UA" sz="2400" dirty="0"/>
+            <a:endParaRPr lang="uk-UA" sz="2400" dirty="0">
+              <a:latin typeface="Calibri" panose="020F0502020204030204" pitchFamily="34" charset="0"/>
+            </a:endParaRPr>
           </a:p>
         </p:txBody>
       </p:sp>
@@ -12974,7 +13223,9 @@
                         </a:spcAft>
                       </a:pPr>
                       <a:r>
-                        <a:rPr lang="en-US" sz="2000" dirty="0"/>
+                        <a:rPr lang="en-US" sz="2000" dirty="0">
+                          <a:latin typeface="Calibri" panose="020F0502020204030204" pitchFamily="34" charset="0"/>
+                        </a:rPr>
                         <a:t>n = 200</a:t>
                       </a:r>
                       <a:endParaRPr lang="uk-UA" sz="2000" dirty="0"/>
@@ -12996,7 +13247,9 @@
                         </a:spcAft>
                       </a:pPr>
                       <a:r>
-                        <a:rPr lang="uk-UA" sz="2000" b="0" dirty="0"/>
+                        <a:rPr lang="uk-UA" sz="2000" b="0" dirty="0">
+                          <a:latin typeface="Calibri" panose="020F0502020204030204" pitchFamily="34" charset="0"/>
+                        </a:rPr>
                         <a:t>Прогнозовані</a:t>
                       </a:r>
                       <a:r>
@@ -13026,7 +13279,9 @@
                         </a:spcAft>
                       </a:pPr>
                       <a:r>
-                        <a:rPr lang="uk-UA" sz="2000" b="0" dirty="0"/>
+                        <a:rPr lang="uk-UA" sz="2000" b="0" dirty="0">
+                          <a:latin typeface="Calibri" panose="020F0502020204030204" pitchFamily="34" charset="0"/>
+                        </a:rPr>
                         <a:t>Прогнозовані</a:t>
                       </a:r>
                       <a:r>
@@ -13051,7 +13306,9 @@
                           <a:spcPts val="600"/>
                         </a:spcAft>
                       </a:pPr>
-                      <a:endParaRPr lang="uk-UA" sz="2000" dirty="0"/>
+                      <a:endParaRPr lang="uk-UA" sz="2000" dirty="0">
+                        <a:latin typeface="Calibri" panose="020F0502020204030204" pitchFamily="34" charset="0"/>
+                      </a:endParaRPr>
                     </a:p>
                   </a:txBody>
                   <a:tcPr anchor="ctr"/>
@@ -13077,7 +13334,9 @@
                         </a:spcAft>
                       </a:pPr>
                       <a:r>
-                        <a:rPr lang="uk-UA" sz="2000" b="0" dirty="0"/>
+                        <a:rPr lang="uk-UA" sz="2000" b="0" dirty="0">
+                          <a:latin typeface="Calibri" panose="020F0502020204030204" pitchFamily="34" charset="0"/>
+                        </a:rPr>
                         <a:t>Реальні </a:t>
                       </a:r>
                       <a:r>
@@ -13107,6 +13366,7 @@
                           <a:highlight>
                             <a:srgbClr val="FFFF00"/>
                           </a:highlight>
+                          <a:latin typeface="Calibri" panose="020F0502020204030204" pitchFamily="34" charset="0"/>
                         </a:rPr>
                         <a:t>TN </a:t>
                       </a:r>
@@ -13144,7 +13404,9 @@
                         </a:spcAft>
                       </a:pPr>
                       <a:r>
-                        <a:rPr lang="en-US" sz="2000" b="1" dirty="0"/>
+                        <a:rPr lang="en-US" sz="2000" b="1" dirty="0">
+                          <a:latin typeface="Calibri" panose="020F0502020204030204" pitchFamily="34" charset="0"/>
+                        </a:rPr>
                         <a:t>FP </a:t>
                       </a:r>
                       <a:r>
@@ -13173,7 +13435,9 @@
                         </a:spcAft>
                       </a:pPr>
                       <a:r>
-                        <a:rPr lang="en-US" sz="2000" b="0" dirty="0"/>
+                        <a:rPr lang="en-US" sz="2000" b="0" dirty="0">
+                          <a:latin typeface="Calibri" panose="020F0502020204030204" pitchFamily="34" charset="0"/>
+                        </a:rPr>
                         <a:t>92</a:t>
                       </a:r>
                       <a:endParaRPr lang="uk-UA" sz="2000" b="0" dirty="0"/>
@@ -13202,7 +13466,9 @@
                         </a:spcAft>
                       </a:pPr>
                       <a:r>
-                        <a:rPr lang="uk-UA" sz="2000" b="0" dirty="0"/>
+                        <a:rPr lang="uk-UA" sz="2000" b="0" dirty="0">
+                          <a:latin typeface="Calibri" panose="020F0502020204030204" pitchFamily="34" charset="0"/>
+                        </a:rPr>
                         <a:t>Реальні </a:t>
                       </a:r>
                       <a:r>
@@ -13228,7 +13494,9 @@
                         </a:spcAft>
                       </a:pPr>
                       <a:r>
-                        <a:rPr lang="en-US" sz="2000" b="1" dirty="0"/>
+                        <a:rPr lang="en-US" sz="2000" b="1" dirty="0">
+                          <a:latin typeface="Calibri" panose="020F0502020204030204" pitchFamily="34" charset="0"/>
+                        </a:rPr>
                         <a:t>FN </a:t>
                       </a:r>
                       <a:r>
@@ -13261,6 +13529,7 @@
                           <a:highlight>
                             <a:srgbClr val="FFFF00"/>
                           </a:highlight>
+                          <a:latin typeface="Calibri" panose="020F0502020204030204" pitchFamily="34" charset="0"/>
                         </a:rPr>
                         <a:t>TP </a:t>
                       </a:r>
@@ -13295,7 +13564,9 @@
                         </a:spcAft>
                       </a:pPr>
                       <a:r>
-                        <a:rPr lang="en-US" sz="2000" b="0" dirty="0"/>
+                        <a:rPr lang="en-US" sz="2000" b="0" dirty="0">
+                          <a:latin typeface="Calibri" panose="020F0502020204030204" pitchFamily="34" charset="0"/>
+                        </a:rPr>
                         <a:t>108</a:t>
                       </a:r>
                       <a:endParaRPr lang="uk-UA" sz="2000" b="0" dirty="0"/>
@@ -13323,7 +13594,9 @@
                           <a:spcPts val="600"/>
                         </a:spcAft>
                       </a:pPr>
-                      <a:endParaRPr lang="uk-UA" sz="2000" b="1" dirty="0"/>
+                      <a:endParaRPr lang="uk-UA" sz="2000" b="1" dirty="0">
+                        <a:latin typeface="Calibri" panose="020F0502020204030204" pitchFamily="34" charset="0"/>
+                      </a:endParaRPr>
                     </a:p>
                   </a:txBody>
                   <a:tcPr anchor="ctr"/>
@@ -13342,7 +13615,9 @@
                         </a:spcAft>
                       </a:pPr>
                       <a:r>
-                        <a:rPr lang="en-US" sz="2000" b="0" dirty="0"/>
+                        <a:rPr lang="en-US" sz="2000" b="0" dirty="0">
+                          <a:latin typeface="Calibri" panose="020F0502020204030204" pitchFamily="34" charset="0"/>
+                        </a:rPr>
                         <a:t>103</a:t>
                       </a:r>
                       <a:endParaRPr lang="uk-UA" sz="2000" b="0" dirty="0"/>
@@ -13364,7 +13639,9 @@
                         </a:spcAft>
                       </a:pPr>
                       <a:r>
-                        <a:rPr lang="en-US" sz="2000" b="0" dirty="0"/>
+                        <a:rPr lang="en-US" sz="2000" b="0" dirty="0">
+                          <a:latin typeface="Calibri" panose="020F0502020204030204" pitchFamily="34" charset="0"/>
+                        </a:rPr>
                         <a:t>97</a:t>
                       </a:r>
                       <a:endParaRPr lang="uk-UA" sz="2000" b="0" dirty="0"/>
@@ -13385,7 +13662,9 @@
                           <a:spcPts val="600"/>
                         </a:spcAft>
                       </a:pPr>
-                      <a:endParaRPr lang="uk-UA" sz="2000" b="0" dirty="0"/>
+                      <a:endParaRPr lang="uk-UA" sz="2000" b="0" dirty="0">
+                        <a:latin typeface="Calibri" panose="020F0502020204030204" pitchFamily="34" charset="0"/>
+                      </a:endParaRPr>
                     </a:p>
                   </a:txBody>
                   <a:tcPr anchor="ctr"/>
@@ -13400,8 +13679,8 @@
           </a:graphicData>
         </a:graphic>
       </p:graphicFrame>
-      <mc:AlternateContent xmlns:mc="http://schemas.openxmlformats.org/markup-compatibility/2006" xmlns:a14="http://schemas.microsoft.com/office/drawing/2010/main">
-        <mc:Choice Requires="a14">
+      <mc:AlternateContent xmlns:mc="http://schemas.openxmlformats.org/markup-compatibility/2006">
+        <mc:Choice xmlns:a14="http://schemas.microsoft.com/office/drawing/2010/main" Requires="a14">
           <p:sp>
             <p:nvSpPr>
               <p:cNvPr id="6" name="Місце для вмісту 1">
@@ -13704,12 +13983,14 @@
                     </m:oMath>
                   </m:oMathPara>
                 </a14:m>
-                <a:endParaRPr lang="uk-UA" sz="2000" dirty="0"/>
+                <a:endParaRPr lang="uk-UA" sz="2000" dirty="0">
+                  <a:latin typeface="Calibri" panose="020F0502020204030204" pitchFamily="34" charset="0"/>
+                </a:endParaRPr>
               </a:p>
             </p:txBody>
           </p:sp>
         </mc:Choice>
-        <mc:Fallback xmlns="">
+        <mc:Fallback>
           <p:sp>
             <p:nvSpPr>
               <p:cNvPr id="6" name="Місце для вмісту 1">
@@ -13744,7 +14025,7 @@
               <a:lstStyle/>
               <a:p>
                 <a:r>
-                  <a:rPr lang="uk-UA">
+                  <a:rPr lang="en-US">
                     <a:noFill/>
                   </a:rPr>
                   <a:t> </a:t>
@@ -13967,7 +14248,9 @@
                         </a:spcAft>
                       </a:pPr>
                       <a:r>
-                        <a:rPr lang="en-US" sz="2000" dirty="0"/>
+                        <a:rPr lang="en-US" sz="2000" dirty="0">
+                          <a:latin typeface="Calibri" panose="020F0502020204030204" pitchFamily="34" charset="0"/>
+                        </a:rPr>
                         <a:t>n = 200</a:t>
                       </a:r>
                       <a:endParaRPr lang="uk-UA" sz="2000" dirty="0"/>
@@ -13989,7 +14272,9 @@
                         </a:spcAft>
                       </a:pPr>
                       <a:r>
-                        <a:rPr lang="uk-UA" sz="2000" b="0" dirty="0"/>
+                        <a:rPr lang="uk-UA" sz="2000" b="0" dirty="0">
+                          <a:latin typeface="Calibri" panose="020F0502020204030204" pitchFamily="34" charset="0"/>
+                        </a:rPr>
                         <a:t>Прогнозовані</a:t>
                       </a:r>
                       <a:r>
@@ -14019,7 +14304,9 @@
                         </a:spcAft>
                       </a:pPr>
                       <a:r>
-                        <a:rPr lang="uk-UA" sz="2000" b="0" dirty="0"/>
+                        <a:rPr lang="uk-UA" sz="2000" b="0" dirty="0">
+                          <a:latin typeface="Calibri" panose="020F0502020204030204" pitchFamily="34" charset="0"/>
+                        </a:rPr>
                         <a:t>Прогнозовані</a:t>
                       </a:r>
                       <a:r>
@@ -14044,7 +14331,9 @@
                           <a:spcPts val="600"/>
                         </a:spcAft>
                       </a:pPr>
-                      <a:endParaRPr lang="uk-UA" sz="2000" dirty="0"/>
+                      <a:endParaRPr lang="uk-UA" sz="2000" dirty="0">
+                        <a:latin typeface="Calibri" panose="020F0502020204030204" pitchFamily="34" charset="0"/>
+                      </a:endParaRPr>
                     </a:p>
                   </a:txBody>
                   <a:tcPr anchor="ctr"/>
@@ -14070,7 +14359,9 @@
                         </a:spcAft>
                       </a:pPr>
                       <a:r>
-                        <a:rPr lang="uk-UA" sz="2000" b="0" dirty="0"/>
+                        <a:rPr lang="uk-UA" sz="2000" b="0" dirty="0">
+                          <a:latin typeface="Calibri" panose="020F0502020204030204" pitchFamily="34" charset="0"/>
+                        </a:rPr>
                         <a:t>Реальні </a:t>
                       </a:r>
                       <a:r>
@@ -14096,7 +14387,9 @@
                         </a:spcAft>
                       </a:pPr>
                       <a:r>
-                        <a:rPr lang="en-US" sz="2000" b="1" dirty="0"/>
+                        <a:rPr lang="en-US" sz="2000" b="1" dirty="0">
+                          <a:latin typeface="Calibri" panose="020F0502020204030204" pitchFamily="34" charset="0"/>
+                        </a:rPr>
                         <a:t>TN </a:t>
                       </a:r>
                       <a:r>
@@ -14129,6 +14422,7 @@
                           <a:highlight>
                             <a:srgbClr val="FFFF00"/>
                           </a:highlight>
+                          <a:latin typeface="Calibri" panose="020F0502020204030204" pitchFamily="34" charset="0"/>
                         </a:rPr>
                         <a:t>FP </a:t>
                       </a:r>
@@ -14166,7 +14460,9 @@
                         </a:spcAft>
                       </a:pPr>
                       <a:r>
-                        <a:rPr lang="en-US" sz="2000" b="0" dirty="0"/>
+                        <a:rPr lang="en-US" sz="2000" b="0" dirty="0">
+                          <a:latin typeface="Calibri" panose="020F0502020204030204" pitchFamily="34" charset="0"/>
+                        </a:rPr>
                         <a:t>92</a:t>
                       </a:r>
                       <a:endParaRPr lang="uk-UA" sz="2000" b="0" dirty="0"/>
@@ -14195,7 +14491,9 @@
                         </a:spcAft>
                       </a:pPr>
                       <a:r>
-                        <a:rPr lang="uk-UA" sz="2000" b="0" dirty="0"/>
+                        <a:rPr lang="uk-UA" sz="2000" b="0" dirty="0">
+                          <a:latin typeface="Calibri" panose="020F0502020204030204" pitchFamily="34" charset="0"/>
+                        </a:rPr>
                         <a:t>Реальні </a:t>
                       </a:r>
                       <a:r>
@@ -14225,6 +14523,7 @@
                           <a:highlight>
                             <a:srgbClr val="FFFF00"/>
                           </a:highlight>
+                          <a:latin typeface="Calibri" panose="020F0502020204030204" pitchFamily="34" charset="0"/>
                         </a:rPr>
                         <a:t>FN </a:t>
                       </a:r>
@@ -14262,7 +14561,9 @@
                         </a:spcAft>
                       </a:pPr>
                       <a:r>
-                        <a:rPr lang="en-US" sz="2000" b="1" dirty="0"/>
+                        <a:rPr lang="en-US" sz="2000" b="1" dirty="0">
+                          <a:latin typeface="Calibri" panose="020F0502020204030204" pitchFamily="34" charset="0"/>
+                        </a:rPr>
                         <a:t>TP </a:t>
                       </a:r>
                       <a:r>
@@ -14288,7 +14589,9 @@
                         </a:spcAft>
                       </a:pPr>
                       <a:r>
-                        <a:rPr lang="en-US" sz="2000" b="0" dirty="0"/>
+                        <a:rPr lang="en-US" sz="2000" b="0" dirty="0">
+                          <a:latin typeface="Calibri" panose="020F0502020204030204" pitchFamily="34" charset="0"/>
+                        </a:rPr>
                         <a:t>108</a:t>
                       </a:r>
                       <a:endParaRPr lang="uk-UA" sz="2000" b="0" dirty="0"/>
@@ -14316,7 +14619,9 @@
                           <a:spcPts val="600"/>
                         </a:spcAft>
                       </a:pPr>
-                      <a:endParaRPr lang="uk-UA" sz="2000" b="1" dirty="0"/>
+                      <a:endParaRPr lang="uk-UA" sz="2000" b="1" dirty="0">
+                        <a:latin typeface="Calibri" panose="020F0502020204030204" pitchFamily="34" charset="0"/>
+                      </a:endParaRPr>
                     </a:p>
                   </a:txBody>
                   <a:tcPr anchor="ctr"/>
@@ -14335,7 +14640,9 @@
                         </a:spcAft>
                       </a:pPr>
                       <a:r>
-                        <a:rPr lang="en-US" sz="2000" b="0" dirty="0"/>
+                        <a:rPr lang="en-US" sz="2000" b="0" dirty="0">
+                          <a:latin typeface="Calibri" panose="020F0502020204030204" pitchFamily="34" charset="0"/>
+                        </a:rPr>
                         <a:t>103</a:t>
                       </a:r>
                       <a:endParaRPr lang="uk-UA" sz="2000" b="0" dirty="0"/>
@@ -14357,7 +14664,9 @@
                         </a:spcAft>
                       </a:pPr>
                       <a:r>
-                        <a:rPr lang="en-US" sz="2000" b="0" dirty="0"/>
+                        <a:rPr lang="en-US" sz="2000" b="0" dirty="0">
+                          <a:latin typeface="Calibri" panose="020F0502020204030204" pitchFamily="34" charset="0"/>
+                        </a:rPr>
                         <a:t>97</a:t>
                       </a:r>
                       <a:endParaRPr lang="uk-UA" sz="2000" b="0" dirty="0"/>
@@ -14378,7 +14687,9 @@
                           <a:spcPts val="600"/>
                         </a:spcAft>
                       </a:pPr>
-                      <a:endParaRPr lang="uk-UA" sz="2000" b="0" dirty="0"/>
+                      <a:endParaRPr lang="uk-UA" sz="2000" b="0" dirty="0">
+                        <a:latin typeface="Calibri" panose="020F0502020204030204" pitchFamily="34" charset="0"/>
+                      </a:endParaRPr>
                     </a:p>
                   </a:txBody>
                   <a:tcPr anchor="ctr"/>
@@ -14393,8 +14704,8 @@
           </a:graphicData>
         </a:graphic>
       </p:graphicFrame>
-      <mc:AlternateContent xmlns:mc="http://schemas.openxmlformats.org/markup-compatibility/2006" xmlns:a14="http://schemas.microsoft.com/office/drawing/2010/main">
-        <mc:Choice Requires="a14">
+      <mc:AlternateContent xmlns:mc="http://schemas.openxmlformats.org/markup-compatibility/2006">
+        <mc:Choice xmlns:a14="http://schemas.microsoft.com/office/drawing/2010/main" Requires="a14">
           <p:sp>
             <p:nvSpPr>
               <p:cNvPr id="6" name="Місце для вмісту 1">
@@ -14709,12 +15020,14 @@
                     </m:oMath>
                   </m:oMathPara>
                 </a14:m>
-                <a:endParaRPr lang="uk-UA" sz="2000" dirty="0"/>
+                <a:endParaRPr lang="uk-UA" sz="2000" dirty="0">
+                  <a:latin typeface="Calibri" panose="020F0502020204030204" pitchFamily="34" charset="0"/>
+                </a:endParaRPr>
               </a:p>
             </p:txBody>
           </p:sp>
         </mc:Choice>
-        <mc:Fallback xmlns="">
+        <mc:Fallback>
           <p:sp>
             <p:nvSpPr>
               <p:cNvPr id="6" name="Місце для вмісту 1">
@@ -14749,7 +15062,7 @@
               <a:lstStyle/>
               <a:p>
                 <a:r>
-                  <a:rPr lang="uk-UA">
+                  <a:rPr lang="en-US">
                     <a:noFill/>
                   </a:rPr>
                   <a:t> </a:t>
@@ -14759,8 +15072,8 @@
           </p:sp>
         </mc:Fallback>
       </mc:AlternateContent>
-      <mc:AlternateContent xmlns:mc="http://schemas.openxmlformats.org/markup-compatibility/2006" xmlns:a14="http://schemas.microsoft.com/office/drawing/2010/main">
-        <mc:Choice Requires="a14">
+      <mc:AlternateContent xmlns:mc="http://schemas.openxmlformats.org/markup-compatibility/2006">
+        <mc:Choice xmlns:a14="http://schemas.microsoft.com/office/drawing/2010/main" Requires="a14">
           <p:sp>
             <p:nvSpPr>
               <p:cNvPr id="7" name="Місце для вмісту 1">
@@ -14995,12 +15308,14 @@
                     </m:oMath>
                   </m:oMathPara>
                 </a14:m>
-                <a:endParaRPr lang="uk-UA" sz="2000" dirty="0"/>
+                <a:endParaRPr lang="uk-UA" sz="2000" dirty="0">
+                  <a:latin typeface="Calibri" panose="020F0502020204030204" pitchFamily="34" charset="0"/>
+                </a:endParaRPr>
               </a:p>
             </p:txBody>
           </p:sp>
         </mc:Choice>
-        <mc:Fallback xmlns="">
+        <mc:Fallback>
           <p:sp>
             <p:nvSpPr>
               <p:cNvPr id="7" name="Місце для вмісту 1">
@@ -15035,7 +15350,7 @@
               <a:lstStyle/>
               <a:p>
                 <a:r>
-                  <a:rPr lang="uk-UA">
+                  <a:rPr lang="en-US">
                     <a:noFill/>
                   </a:rPr>
                   <a:t> </a:t>
@@ -15629,51 +15944,75 @@
               <a:buNone/>
             </a:pPr>
             <a:r>
-              <a:rPr lang="en-US" sz="2400" dirty="0"/>
+              <a:rPr lang="en-US" sz="2400" dirty="0">
+                <a:latin typeface="Calibri" panose="020F0502020204030204" pitchFamily="34" charset="0"/>
+              </a:rPr>
               <a:t>ROC</a:t>
             </a:r>
             <a:r>
-              <a:rPr lang="uk-UA" sz="2400" dirty="0"/>
+              <a:rPr lang="uk-UA" sz="2400" dirty="0">
+                <a:latin typeface="Calibri" panose="020F0502020204030204" pitchFamily="34" charset="0"/>
+              </a:rPr>
               <a:t>-крива</a:t>
             </a:r>
             <a:r>
-              <a:rPr lang="ru-RU" sz="2400" dirty="0"/>
+              <a:rPr lang="ru-RU" sz="2400" dirty="0">
+                <a:latin typeface="Calibri" panose="020F0502020204030204" pitchFamily="34" charset="0"/>
+              </a:rPr>
               <a:t> </a:t>
             </a:r>
             <a:r>
-              <a:rPr lang="uk-UA" sz="2400" dirty="0"/>
+              <a:rPr lang="uk-UA" sz="2400" dirty="0">
+                <a:latin typeface="Calibri" panose="020F0502020204030204" pitchFamily="34" charset="0"/>
+              </a:rPr>
               <a:t>показує співвідношення між </a:t>
             </a:r>
             <a:r>
-              <a:rPr lang="en-US" sz="2400" dirty="0"/>
+              <a:rPr lang="en-US" sz="2400" dirty="0">
+                <a:latin typeface="Calibri" panose="020F0502020204030204" pitchFamily="34" charset="0"/>
+              </a:rPr>
               <a:t>TP </a:t>
             </a:r>
             <a:r>
-              <a:rPr lang="ru-RU" sz="2400" dirty="0"/>
+              <a:rPr lang="ru-RU" sz="2400" dirty="0">
+                <a:latin typeface="Calibri" panose="020F0502020204030204" pitchFamily="34" charset="0"/>
+              </a:rPr>
               <a:t>та </a:t>
             </a:r>
             <a:r>
-              <a:rPr lang="en-US" sz="2400" dirty="0"/>
+              <a:rPr lang="en-US" sz="2400" dirty="0">
+                <a:latin typeface="Calibri" panose="020F0502020204030204" pitchFamily="34" charset="0"/>
+              </a:rPr>
               <a:t>FP </a:t>
             </a:r>
             <a:r>
-              <a:rPr lang="uk-UA" sz="2400" dirty="0"/>
+              <a:rPr lang="uk-UA" sz="2400" dirty="0">
+                <a:latin typeface="Calibri" panose="020F0502020204030204" pitchFamily="34" charset="0"/>
+              </a:rPr>
               <a:t>при різній лінії</a:t>
             </a:r>
             <a:r>
-              <a:rPr lang="en-US" sz="2400" dirty="0"/>
+              <a:rPr lang="en-US" sz="2400" dirty="0">
+                <a:latin typeface="Calibri" panose="020F0502020204030204" pitchFamily="34" charset="0"/>
+              </a:rPr>
               <a:t> </a:t>
             </a:r>
             <a:r>
-              <a:rPr lang="uk-UA" sz="2400" dirty="0"/>
+              <a:rPr lang="uk-UA" sz="2400" dirty="0">
+                <a:latin typeface="Calibri" panose="020F0502020204030204" pitchFamily="34" charset="0"/>
+              </a:rPr>
               <a:t>розділу (</a:t>
             </a:r>
             <a:r>
-              <a:rPr lang="en-US" sz="2400" dirty="0"/>
+              <a:rPr lang="en-US" sz="2400" dirty="0">
+                <a:latin typeface="Calibri" panose="020F0502020204030204" pitchFamily="34" charset="0"/>
+              </a:rPr>
               <a:t>cut-off</a:t>
             </a:r>
             <a:r>
-              <a:rPr lang="uk-UA" sz="2400" dirty="0"/>
+              <a:rPr lang="uk-UA" sz="2400" dirty="0">
+                <a:latin typeface="Calibri" panose="020F0502020204030204" pitchFamily="34" charset="0"/>
+              </a:rPr>
               <a:t>).</a:t>
             </a:r>
           </a:p>
@@ -15932,7 +16271,9 @@
                   <a:lstStyle/>
                   <a:p>
                     <a:pPr algn="ctr"/>
-                    <a:endParaRPr lang="uk-UA"/>
+                    <a:endParaRPr lang="uk-UA" dirty="0">
+                      <a:latin typeface="Calibri" panose="020F0502020204030204" pitchFamily="34" charset="0"/>
+                    </a:endParaRPr>
                   </a:p>
                 </p:txBody>
               </p:sp>
@@ -16059,6 +16400,7 @@
                       <a:solidFill>
                         <a:srgbClr val="000000"/>
                       </a:solidFill>
+                      <a:latin typeface="Calibri" panose="020F0502020204030204" pitchFamily="34" charset="0"/>
                     </a:rPr>
                     <a:t>TP Rate</a:t>
                   </a:r>
@@ -16066,6 +16408,7 @@
                     <a:solidFill>
                       <a:srgbClr val="000000"/>
                     </a:solidFill>
+                    <a:latin typeface="Calibri" panose="020F0502020204030204" pitchFamily="34" charset="0"/>
                   </a:endParaRPr>
                 </a:p>
               </p:txBody>
@@ -16104,6 +16447,7 @@
                       <a:solidFill>
                         <a:srgbClr val="000000"/>
                       </a:solidFill>
+                      <a:latin typeface="Calibri" panose="020F0502020204030204" pitchFamily="34" charset="0"/>
                     </a:rPr>
                     <a:t>FP Rate</a:t>
                   </a:r>
@@ -16111,6 +16455,7 @@
                     <a:solidFill>
                       <a:srgbClr val="000000"/>
                     </a:solidFill>
+                    <a:latin typeface="Calibri" panose="020F0502020204030204" pitchFamily="34" charset="0"/>
                   </a:endParaRPr>
                 </a:p>
               </p:txBody>
@@ -16386,7 +16731,9 @@
               <a:lstStyle/>
               <a:p>
                 <a:pPr algn="ctr"/>
-                <a:endParaRPr lang="uk-UA"/>
+                <a:endParaRPr lang="uk-UA" dirty="0">
+                  <a:latin typeface="Calibri" panose="020F0502020204030204" pitchFamily="34" charset="0"/>
+                </a:endParaRPr>
               </a:p>
             </p:txBody>
           </p:sp>
@@ -16433,7 +16780,9 @@
             <a:lstStyle/>
             <a:p>
               <a:pPr algn="ctr"/>
-              <a:endParaRPr lang="uk-UA"/>
+              <a:endParaRPr lang="uk-UA" dirty="0">
+                <a:latin typeface="Calibri" panose="020F0502020204030204" pitchFamily="34" charset="0"/>
+              </a:endParaRPr>
             </a:p>
           </p:txBody>
         </p:sp>
@@ -16516,7 +16865,9 @@
           <a:lstStyle/>
           <a:p>
             <a:pPr algn="ctr"/>
-            <a:endParaRPr lang="uk-UA"/>
+            <a:endParaRPr lang="uk-UA" dirty="0">
+              <a:latin typeface="Calibri" panose="020F0502020204030204" pitchFamily="34" charset="0"/>
+            </a:endParaRPr>
           </a:p>
         </p:txBody>
       </p:sp>
@@ -16883,7 +17234,9 @@
                 <a:lstStyle/>
                 <a:p>
                   <a:pPr algn="ctr"/>
-                  <a:endParaRPr lang="uk-UA"/>
+                  <a:endParaRPr lang="uk-UA" dirty="0">
+                    <a:latin typeface="Calibri" panose="020F0502020204030204" pitchFamily="34" charset="0"/>
+                  </a:endParaRPr>
                 </a:p>
               </p:txBody>
             </p:sp>
@@ -17010,6 +17363,7 @@
                     <a:solidFill>
                       <a:srgbClr val="000000"/>
                     </a:solidFill>
+                    <a:latin typeface="Calibri" panose="020F0502020204030204" pitchFamily="34" charset="0"/>
                   </a:rPr>
                   <a:t>TP Rate</a:t>
                 </a:r>
@@ -17017,6 +17371,7 @@
                   <a:solidFill>
                     <a:srgbClr val="000000"/>
                   </a:solidFill>
+                  <a:latin typeface="Calibri" panose="020F0502020204030204" pitchFamily="34" charset="0"/>
                 </a:endParaRPr>
               </a:p>
             </p:txBody>
@@ -17055,6 +17410,7 @@
                     <a:solidFill>
                       <a:srgbClr val="000000"/>
                     </a:solidFill>
+                    <a:latin typeface="Calibri" panose="020F0502020204030204" pitchFamily="34" charset="0"/>
                   </a:rPr>
                   <a:t>FP Rate</a:t>
                 </a:r>
@@ -17062,6 +17418,7 @@
                   <a:solidFill>
                     <a:srgbClr val="000000"/>
                   </a:solidFill>
+                  <a:latin typeface="Calibri" panose="020F0502020204030204" pitchFamily="34" charset="0"/>
                 </a:endParaRPr>
               </a:p>
             </p:txBody>
@@ -17158,8 +17515,8 @@
           </a:fontRef>
         </p:style>
       </p:cxnSp>
-      <mc:AlternateContent xmlns:mc="http://schemas.openxmlformats.org/markup-compatibility/2006" xmlns:a14="http://schemas.microsoft.com/office/drawing/2010/main">
-        <mc:Choice Requires="a14">
+      <mc:AlternateContent xmlns:mc="http://schemas.openxmlformats.org/markup-compatibility/2006">
+        <mc:Choice xmlns:a14="http://schemas.microsoft.com/office/drawing/2010/main" Requires="a14">
           <p:sp>
             <p:nvSpPr>
               <p:cNvPr id="27" name="Місце для вмісту 1">
@@ -17356,15 +17713,21 @@
                   <a:buNone/>
                 </a:pPr>
                 <a:r>
-                  <a:rPr lang="uk-UA" sz="2400" dirty="0"/>
+                  <a:rPr lang="uk-UA" sz="2400" dirty="0">
+                    <a:latin typeface="Calibri" panose="020F0502020204030204" pitchFamily="34" charset="0"/>
+                  </a:rPr>
                   <a:t>Коефіцієнт Джині – вказує на нерівність у розподілі показника </a:t>
                 </a:r>
                 <a:r>
-                  <a:rPr lang="en-US" sz="2400" dirty="0"/>
+                  <a:rPr lang="en-US" sz="2400" dirty="0">
+                    <a:latin typeface="Calibri" panose="020F0502020204030204" pitchFamily="34" charset="0"/>
+                  </a:rPr>
                   <a:t>[0;1]</a:t>
                 </a:r>
                 <a:r>
-                  <a:rPr lang="uk-UA" sz="2400" dirty="0"/>
+                  <a:rPr lang="uk-UA" sz="2400" dirty="0">
+                    <a:latin typeface="Calibri" panose="020F0502020204030204" pitchFamily="34" charset="0"/>
+                  </a:rPr>
                   <a:t>:</a:t>
                 </a:r>
               </a:p>
@@ -17372,7 +17735,9 @@
                 <a:pPr marL="0" indent="0">
                   <a:buNone/>
                 </a:pPr>
-                <a:endParaRPr lang="en-US" sz="2400" dirty="0"/>
+                <a:endParaRPr lang="en-US" sz="2400" dirty="0">
+                  <a:latin typeface="Calibri" panose="020F0502020204030204" pitchFamily="34" charset="0"/>
+                </a:endParaRPr>
               </a:p>
               <a:p>
                 <a:pPr marL="0" indent="0">
@@ -17411,12 +17776,14 @@
                     </m:oMath>
                   </m:oMathPara>
                 </a14:m>
-                <a:endParaRPr lang="uk-UA" sz="2400" dirty="0"/>
+                <a:endParaRPr lang="uk-UA" sz="2400" dirty="0">
+                  <a:latin typeface="Calibri" panose="020F0502020204030204" pitchFamily="34" charset="0"/>
+                </a:endParaRPr>
               </a:p>
             </p:txBody>
           </p:sp>
         </mc:Choice>
-        <mc:Fallback xmlns="">
+        <mc:Fallback>
           <p:sp>
             <p:nvSpPr>
               <p:cNvPr id="27" name="Місце для вмісту 1">
@@ -17442,7 +17809,7 @@
               <a:blipFill>
                 <a:blip r:embed="rId3"/>
                 <a:stretch>
-                  <a:fillRect l="-1441" t="-5098"/>
+                  <a:fillRect l="-1441" t="-5490"/>
                 </a:stretch>
               </a:blipFill>
             </p:spPr>
@@ -17451,7 +17818,7 @@
               <a:lstStyle/>
               <a:p>
                 <a:r>
-                  <a:rPr lang="uk-UA">
+                  <a:rPr lang="en-US">
                     <a:noFill/>
                   </a:rPr>
                   <a:t> </a:t>
@@ -17759,6 +18126,7 @@
                 <a:solidFill>
                   <a:srgbClr val="000000"/>
                 </a:solidFill>
+                <a:latin typeface="Calibri" panose="020F0502020204030204" pitchFamily="34" charset="0"/>
               </a:rPr>
               <a:t>Клебан Ю.В.</a:t>
             </a:r>
@@ -17963,6 +18331,7 @@
                 <a:solidFill>
                   <a:srgbClr val="000000"/>
                 </a:solidFill>
+                <a:latin typeface="Calibri" panose="020F0502020204030204" pitchFamily="34" charset="0"/>
               </a:rPr>
               <a:t>м. Київ, 2018</a:t>
             </a:r>
@@ -18248,6 +18617,7 @@
                 <a:solidFill>
                   <a:srgbClr val="000000"/>
                 </a:solidFill>
+                <a:latin typeface="Calibri" panose="020F0502020204030204" pitchFamily="34" charset="0"/>
               </a:rPr>
               <a:t>+</a:t>
             </a:r>
@@ -18255,6 +18625,7 @@
               <a:solidFill>
                 <a:srgbClr val="000000"/>
               </a:solidFill>
+              <a:latin typeface="Calibri" panose="020F0502020204030204" pitchFamily="34" charset="0"/>
             </a:endParaRPr>
           </a:p>
         </p:txBody>
@@ -19332,6 +19703,7 @@
                 <a:solidFill>
                   <a:srgbClr val="000000"/>
                 </a:solidFill>
+                <a:latin typeface="Calibri" panose="020F0502020204030204" pitchFamily="34" charset="0"/>
               </a:rPr>
               <a:t>Клебан Ю.В.</a:t>
             </a:r>
@@ -19536,6 +19908,7 @@
                 <a:solidFill>
                   <a:srgbClr val="000000"/>
                 </a:solidFill>
+                <a:latin typeface="Calibri" panose="020F0502020204030204" pitchFamily="34" charset="0"/>
               </a:rPr>
               <a:t>м. Київ, 2018</a:t>
             </a:r>
@@ -19821,6 +20194,7 @@
                 <a:solidFill>
                   <a:srgbClr val="000000"/>
                 </a:solidFill>
+                <a:latin typeface="Calibri" panose="020F0502020204030204" pitchFamily="34" charset="0"/>
               </a:rPr>
               <a:t>+</a:t>
             </a:r>
@@ -19828,6 +20202,7 @@
               <a:solidFill>
                 <a:srgbClr val="000000"/>
               </a:solidFill>
+              <a:latin typeface="Calibri" panose="020F0502020204030204" pitchFamily="34" charset="0"/>
             </a:endParaRPr>
           </a:p>
         </p:txBody>
@@ -20417,7 +20792,9 @@
           </a:lstStyle>
           <a:p>
             <a:r>
-              <a:rPr lang="uk-UA" sz="2800" dirty="0"/>
+              <a:rPr lang="uk-UA" sz="2800" dirty="0">
+                <a:latin typeface="Calibri" panose="020F0502020204030204" pitchFamily="34" charset="0"/>
+              </a:rPr>
               <a:t>у задачах бінарної класифікації</a:t>
             </a:r>
           </a:p>
@@ -20617,7 +20994,9 @@
             <a:lstStyle/>
             <a:p>
               <a:pPr algn="ctr"/>
-              <a:endParaRPr lang="uk-UA"/>
+              <a:endParaRPr lang="uk-UA" dirty="0">
+                <a:latin typeface="Calibri" panose="020F0502020204030204" pitchFamily="34" charset="0"/>
+              </a:endParaRPr>
             </a:p>
           </p:txBody>
         </p:sp>
@@ -20663,7 +21042,9 @@
             <a:lstStyle/>
             <a:p>
               <a:pPr algn="ctr"/>
-              <a:endParaRPr lang="uk-UA"/>
+              <a:endParaRPr lang="uk-UA" dirty="0">
+                <a:latin typeface="Calibri" panose="020F0502020204030204" pitchFamily="34" charset="0"/>
+              </a:endParaRPr>
             </a:p>
           </p:txBody>
         </p:sp>
@@ -20709,7 +21090,9 @@
             <a:lstStyle/>
             <a:p>
               <a:pPr algn="ctr"/>
-              <a:endParaRPr lang="uk-UA"/>
+              <a:endParaRPr lang="uk-UA" dirty="0">
+                <a:latin typeface="Calibri" panose="020F0502020204030204" pitchFamily="34" charset="0"/>
+              </a:endParaRPr>
             </a:p>
           </p:txBody>
         </p:sp>
@@ -20755,7 +21138,9 @@
             <a:lstStyle/>
             <a:p>
               <a:pPr algn="ctr"/>
-              <a:endParaRPr lang="uk-UA"/>
+              <a:endParaRPr lang="uk-UA" dirty="0">
+                <a:latin typeface="Calibri" panose="020F0502020204030204" pitchFamily="34" charset="0"/>
+              </a:endParaRPr>
             </a:p>
           </p:txBody>
         </p:sp>
@@ -20801,7 +21186,9 @@
             <a:lstStyle/>
             <a:p>
               <a:pPr algn="ctr"/>
-              <a:endParaRPr lang="uk-UA"/>
+              <a:endParaRPr lang="uk-UA" dirty="0">
+                <a:latin typeface="Calibri" panose="020F0502020204030204" pitchFamily="34" charset="0"/>
+              </a:endParaRPr>
             </a:p>
           </p:txBody>
         </p:sp>
@@ -20847,7 +21234,9 @@
             <a:lstStyle/>
             <a:p>
               <a:pPr algn="ctr"/>
-              <a:endParaRPr lang="uk-UA"/>
+              <a:endParaRPr lang="uk-UA" dirty="0">
+                <a:latin typeface="Calibri" panose="020F0502020204030204" pitchFamily="34" charset="0"/>
+              </a:endParaRPr>
             </a:p>
           </p:txBody>
         </p:sp>
@@ -20893,7 +21282,9 @@
             <a:lstStyle/>
             <a:p>
               <a:pPr algn="ctr"/>
-              <a:endParaRPr lang="uk-UA"/>
+              <a:endParaRPr lang="uk-UA" dirty="0">
+                <a:latin typeface="Calibri" panose="020F0502020204030204" pitchFamily="34" charset="0"/>
+              </a:endParaRPr>
             </a:p>
           </p:txBody>
         </p:sp>
@@ -20939,7 +21330,9 @@
             <a:lstStyle/>
             <a:p>
               <a:pPr algn="ctr"/>
-              <a:endParaRPr lang="uk-UA"/>
+              <a:endParaRPr lang="uk-UA" dirty="0">
+                <a:latin typeface="Calibri" panose="020F0502020204030204" pitchFamily="34" charset="0"/>
+              </a:endParaRPr>
             </a:p>
           </p:txBody>
         </p:sp>
@@ -20985,7 +21378,9 @@
             <a:lstStyle/>
             <a:p>
               <a:pPr algn="ctr"/>
-              <a:endParaRPr lang="uk-UA"/>
+              <a:endParaRPr lang="uk-UA" dirty="0">
+                <a:latin typeface="Calibri" panose="020F0502020204030204" pitchFamily="34" charset="0"/>
+              </a:endParaRPr>
             </a:p>
           </p:txBody>
         </p:sp>
@@ -21031,7 +21426,9 @@
             <a:lstStyle/>
             <a:p>
               <a:pPr algn="ctr"/>
-              <a:endParaRPr lang="uk-UA"/>
+              <a:endParaRPr lang="uk-UA" dirty="0">
+                <a:latin typeface="Calibri" panose="020F0502020204030204" pitchFamily="34" charset="0"/>
+              </a:endParaRPr>
             </a:p>
           </p:txBody>
         </p:sp>
@@ -21077,7 +21474,9 @@
             <a:lstStyle/>
             <a:p>
               <a:pPr algn="ctr"/>
-              <a:endParaRPr lang="uk-UA"/>
+              <a:endParaRPr lang="uk-UA" dirty="0">
+                <a:latin typeface="Calibri" panose="020F0502020204030204" pitchFamily="34" charset="0"/>
+              </a:endParaRPr>
             </a:p>
           </p:txBody>
         </p:sp>
@@ -21123,7 +21522,9 @@
             <a:lstStyle/>
             <a:p>
               <a:pPr algn="ctr"/>
-              <a:endParaRPr lang="uk-UA"/>
+              <a:endParaRPr lang="uk-UA" dirty="0">
+                <a:latin typeface="Calibri" panose="020F0502020204030204" pitchFamily="34" charset="0"/>
+              </a:endParaRPr>
             </a:p>
           </p:txBody>
         </p:sp>
@@ -21169,7 +21570,9 @@
             <a:lstStyle/>
             <a:p>
               <a:pPr algn="ctr"/>
-              <a:endParaRPr lang="uk-UA"/>
+              <a:endParaRPr lang="uk-UA" dirty="0">
+                <a:latin typeface="Calibri" panose="020F0502020204030204" pitchFamily="34" charset="0"/>
+              </a:endParaRPr>
             </a:p>
           </p:txBody>
         </p:sp>
@@ -21215,7 +21618,9 @@
             <a:lstStyle/>
             <a:p>
               <a:pPr algn="ctr"/>
-              <a:endParaRPr lang="uk-UA"/>
+              <a:endParaRPr lang="uk-UA" dirty="0">
+                <a:latin typeface="Calibri" panose="020F0502020204030204" pitchFamily="34" charset="0"/>
+              </a:endParaRPr>
             </a:p>
           </p:txBody>
         </p:sp>
@@ -21261,7 +21666,9 @@
             <a:lstStyle/>
             <a:p>
               <a:pPr algn="ctr"/>
-              <a:endParaRPr lang="uk-UA"/>
+              <a:endParaRPr lang="uk-UA" dirty="0">
+                <a:latin typeface="Calibri" panose="020F0502020204030204" pitchFamily="34" charset="0"/>
+              </a:endParaRPr>
             </a:p>
           </p:txBody>
         </p:sp>
@@ -21307,7 +21714,9 @@
             <a:lstStyle/>
             <a:p>
               <a:pPr algn="ctr"/>
-              <a:endParaRPr lang="uk-UA"/>
+              <a:endParaRPr lang="uk-UA" dirty="0">
+                <a:latin typeface="Calibri" panose="020F0502020204030204" pitchFamily="34" charset="0"/>
+              </a:endParaRPr>
             </a:p>
           </p:txBody>
         </p:sp>
@@ -21353,7 +21762,9 @@
             <a:lstStyle/>
             <a:p>
               <a:pPr algn="ctr"/>
-              <a:endParaRPr lang="uk-UA"/>
+              <a:endParaRPr lang="uk-UA" dirty="0">
+                <a:latin typeface="Calibri" panose="020F0502020204030204" pitchFamily="34" charset="0"/>
+              </a:endParaRPr>
             </a:p>
           </p:txBody>
         </p:sp>
@@ -21399,7 +21810,9 @@
             <a:lstStyle/>
             <a:p>
               <a:pPr algn="ctr"/>
-              <a:endParaRPr lang="uk-UA"/>
+              <a:endParaRPr lang="uk-UA" dirty="0">
+                <a:latin typeface="Calibri" panose="020F0502020204030204" pitchFamily="34" charset="0"/>
+              </a:endParaRPr>
             </a:p>
           </p:txBody>
         </p:sp>
@@ -21445,7 +21858,9 @@
             <a:lstStyle/>
             <a:p>
               <a:pPr algn="ctr"/>
-              <a:endParaRPr lang="uk-UA"/>
+              <a:endParaRPr lang="uk-UA" dirty="0">
+                <a:latin typeface="Calibri" panose="020F0502020204030204" pitchFamily="34" charset="0"/>
+              </a:endParaRPr>
             </a:p>
           </p:txBody>
         </p:sp>
@@ -21491,7 +21906,9 @@
             <a:lstStyle/>
             <a:p>
               <a:pPr algn="ctr"/>
-              <a:endParaRPr lang="uk-UA"/>
+              <a:endParaRPr lang="uk-UA" dirty="0">
+                <a:latin typeface="Calibri" panose="020F0502020204030204" pitchFamily="34" charset="0"/>
+              </a:endParaRPr>
             </a:p>
           </p:txBody>
         </p:sp>
@@ -21537,7 +21954,9 @@
             <a:lstStyle/>
             <a:p>
               <a:pPr algn="ctr"/>
-              <a:endParaRPr lang="uk-UA"/>
+              <a:endParaRPr lang="uk-UA" dirty="0">
+                <a:latin typeface="Calibri" panose="020F0502020204030204" pitchFamily="34" charset="0"/>
+              </a:endParaRPr>
             </a:p>
           </p:txBody>
         </p:sp>
@@ -21583,7 +22002,9 @@
             <a:lstStyle/>
             <a:p>
               <a:pPr algn="ctr"/>
-              <a:endParaRPr lang="uk-UA"/>
+              <a:endParaRPr lang="uk-UA" dirty="0">
+                <a:latin typeface="Calibri" panose="020F0502020204030204" pitchFamily="34" charset="0"/>
+              </a:endParaRPr>
             </a:p>
           </p:txBody>
         </p:sp>
@@ -21629,7 +22050,9 @@
             <a:lstStyle/>
             <a:p>
               <a:pPr algn="ctr"/>
-              <a:endParaRPr lang="uk-UA"/>
+              <a:endParaRPr lang="uk-UA" dirty="0">
+                <a:latin typeface="Calibri" panose="020F0502020204030204" pitchFamily="34" charset="0"/>
+              </a:endParaRPr>
             </a:p>
           </p:txBody>
         </p:sp>
@@ -21675,7 +22098,9 @@
             <a:lstStyle/>
             <a:p>
               <a:pPr algn="ctr"/>
-              <a:endParaRPr lang="uk-UA"/>
+              <a:endParaRPr lang="uk-UA" dirty="0">
+                <a:latin typeface="Calibri" panose="020F0502020204030204" pitchFamily="34" charset="0"/>
+              </a:endParaRPr>
             </a:p>
           </p:txBody>
         </p:sp>
@@ -21721,7 +22146,9 @@
             <a:lstStyle/>
             <a:p>
               <a:pPr algn="ctr"/>
-              <a:endParaRPr lang="uk-UA"/>
+              <a:endParaRPr lang="uk-UA" dirty="0">
+                <a:latin typeface="Calibri" panose="020F0502020204030204" pitchFamily="34" charset="0"/>
+              </a:endParaRPr>
             </a:p>
           </p:txBody>
         </p:sp>
@@ -21801,10 +22228,14 @@
             <a:p>
               <a:pPr algn="r"/>
               <a:r>
-                <a:rPr lang="en-US" dirty="0"/>
+                <a:rPr lang="en-US" dirty="0">
+                  <a:latin typeface="Calibri" panose="020F0502020204030204" pitchFamily="34" charset="0"/>
+                </a:rPr>
                 <a:t>y=1</a:t>
               </a:r>
-              <a:endParaRPr lang="uk-UA" dirty="0"/>
+              <a:endParaRPr lang="uk-UA" dirty="0">
+                <a:latin typeface="Calibri" panose="020F0502020204030204" pitchFamily="34" charset="0"/>
+              </a:endParaRPr>
             </a:p>
           </p:txBody>
         </p:sp>
@@ -21838,10 +22269,14 @@
             <a:p>
               <a:pPr algn="r"/>
               <a:r>
-                <a:rPr lang="en-US" dirty="0"/>
+                <a:rPr lang="en-US" dirty="0">
+                  <a:latin typeface="Calibri" panose="020F0502020204030204" pitchFamily="34" charset="0"/>
+                </a:rPr>
                 <a:t>y=0</a:t>
               </a:r>
-              <a:endParaRPr lang="uk-UA" dirty="0"/>
+              <a:endParaRPr lang="uk-UA" dirty="0">
+                <a:latin typeface="Calibri" panose="020F0502020204030204" pitchFamily="34" charset="0"/>
+              </a:endParaRPr>
             </a:p>
           </p:txBody>
         </p:sp>
@@ -21879,6 +22314,7 @@
                   <a:solidFill>
                     <a:srgbClr val="000000"/>
                   </a:solidFill>
+                  <a:latin typeface="Calibri" panose="020F0502020204030204" pitchFamily="34" charset="0"/>
                 </a:rPr>
                 <a:t>Y</a:t>
               </a:r>
@@ -21886,6 +22322,7 @@
                 <a:solidFill>
                   <a:srgbClr val="000000"/>
                 </a:solidFill>
+                <a:latin typeface="Calibri" panose="020F0502020204030204" pitchFamily="34" charset="0"/>
               </a:endParaRPr>
             </a:p>
           </p:txBody>
@@ -21924,6 +22361,7 @@
                   <a:solidFill>
                     <a:srgbClr val="000000"/>
                   </a:solidFill>
+                  <a:latin typeface="Calibri" panose="020F0502020204030204" pitchFamily="34" charset="0"/>
                 </a:rPr>
                 <a:t>X</a:t>
               </a:r>
@@ -21931,6 +22369,7 @@
                 <a:solidFill>
                   <a:srgbClr val="000000"/>
                 </a:solidFill>
+                <a:latin typeface="Calibri" panose="020F0502020204030204" pitchFamily="34" charset="0"/>
               </a:endParaRPr>
             </a:p>
           </p:txBody>
@@ -21969,6 +22408,7 @@
                   <a:solidFill>
                     <a:srgbClr val="007B8C"/>
                   </a:solidFill>
+                  <a:latin typeface="Calibri" panose="020F0502020204030204" pitchFamily="34" charset="0"/>
                 </a:rPr>
                 <a:t>ЛІНІЙНА РЕГРЕСІЯ</a:t>
               </a:r>
@@ -22008,6 +22448,7 @@
                   <a:solidFill>
                     <a:srgbClr val="4F4F4F"/>
                   </a:solidFill>
+                  <a:latin typeface="Calibri" panose="020F0502020204030204" pitchFamily="34" charset="0"/>
                 </a:rPr>
                 <a:t>Значення </a:t>
               </a:r>
@@ -22016,6 +22457,7 @@
                   <a:solidFill>
                     <a:srgbClr val="4F4F4F"/>
                   </a:solidFill>
+                  <a:latin typeface="Calibri" panose="020F0502020204030204" pitchFamily="34" charset="0"/>
                 </a:rPr>
                 <a:t>Y </a:t>
               </a:r>
@@ -22024,6 +22466,7 @@
                   <a:solidFill>
                     <a:srgbClr val="4F4F4F"/>
                   </a:solidFill>
+                  <a:latin typeface="Calibri" panose="020F0502020204030204" pitchFamily="34" charset="0"/>
                 </a:rPr>
                 <a:t>можуть виходити за межі </a:t>
               </a:r>
@@ -22032,6 +22475,7 @@
                   <a:solidFill>
                     <a:srgbClr val="4F4F4F"/>
                   </a:solidFill>
+                  <a:latin typeface="Calibri" panose="020F0502020204030204" pitchFamily="34" charset="0"/>
                 </a:rPr>
                 <a:t>[0;1]</a:t>
               </a:r>
@@ -22039,6 +22483,7 @@
                 <a:solidFill>
                   <a:srgbClr val="4F4F4F"/>
                 </a:solidFill>
+                <a:latin typeface="Calibri" panose="020F0502020204030204" pitchFamily="34" charset="0"/>
               </a:endParaRPr>
             </a:p>
           </p:txBody>
@@ -22166,7 +22611,9 @@
             <a:lstStyle/>
             <a:p>
               <a:pPr algn="ctr"/>
-              <a:endParaRPr lang="uk-UA"/>
+              <a:endParaRPr lang="uk-UA" dirty="0">
+                <a:latin typeface="Calibri" panose="020F0502020204030204" pitchFamily="34" charset="0"/>
+              </a:endParaRPr>
             </a:p>
           </p:txBody>
         </p:sp>
@@ -22364,7 +22811,9 @@
               <a:lstStyle/>
               <a:p>
                 <a:pPr algn="ctr"/>
-                <a:endParaRPr lang="uk-UA"/>
+                <a:endParaRPr lang="uk-UA" dirty="0">
+                  <a:latin typeface="Calibri" panose="020F0502020204030204" pitchFamily="34" charset="0"/>
+                </a:endParaRPr>
               </a:p>
             </p:txBody>
           </p:sp>
@@ -22410,7 +22859,9 @@
               <a:lstStyle/>
               <a:p>
                 <a:pPr algn="ctr"/>
-                <a:endParaRPr lang="uk-UA"/>
+                <a:endParaRPr lang="uk-UA" dirty="0">
+                  <a:latin typeface="Calibri" panose="020F0502020204030204" pitchFamily="34" charset="0"/>
+                </a:endParaRPr>
               </a:p>
             </p:txBody>
           </p:sp>
@@ -22456,7 +22907,9 @@
               <a:lstStyle/>
               <a:p>
                 <a:pPr algn="ctr"/>
-                <a:endParaRPr lang="uk-UA"/>
+                <a:endParaRPr lang="uk-UA" dirty="0">
+                  <a:latin typeface="Calibri" panose="020F0502020204030204" pitchFamily="34" charset="0"/>
+                </a:endParaRPr>
               </a:p>
             </p:txBody>
           </p:sp>
@@ -22502,7 +22955,9 @@
               <a:lstStyle/>
               <a:p>
                 <a:pPr algn="ctr"/>
-                <a:endParaRPr lang="uk-UA"/>
+                <a:endParaRPr lang="uk-UA" dirty="0">
+                  <a:latin typeface="Calibri" panose="020F0502020204030204" pitchFamily="34" charset="0"/>
+                </a:endParaRPr>
               </a:p>
             </p:txBody>
           </p:sp>
@@ -22548,7 +23003,9 @@
               <a:lstStyle/>
               <a:p>
                 <a:pPr algn="ctr"/>
-                <a:endParaRPr lang="uk-UA"/>
+                <a:endParaRPr lang="uk-UA" dirty="0">
+                  <a:latin typeface="Calibri" panose="020F0502020204030204" pitchFamily="34" charset="0"/>
+                </a:endParaRPr>
               </a:p>
             </p:txBody>
           </p:sp>
@@ -22594,7 +23051,9 @@
               <a:lstStyle/>
               <a:p>
                 <a:pPr algn="ctr"/>
-                <a:endParaRPr lang="uk-UA"/>
+                <a:endParaRPr lang="uk-UA" dirty="0">
+                  <a:latin typeface="Calibri" panose="020F0502020204030204" pitchFamily="34" charset="0"/>
+                </a:endParaRPr>
               </a:p>
             </p:txBody>
           </p:sp>
@@ -22640,7 +23099,9 @@
               <a:lstStyle/>
               <a:p>
                 <a:pPr algn="ctr"/>
-                <a:endParaRPr lang="uk-UA"/>
+                <a:endParaRPr lang="uk-UA" dirty="0">
+                  <a:latin typeface="Calibri" panose="020F0502020204030204" pitchFamily="34" charset="0"/>
+                </a:endParaRPr>
               </a:p>
             </p:txBody>
           </p:sp>
@@ -22686,7 +23147,9 @@
               <a:lstStyle/>
               <a:p>
                 <a:pPr algn="ctr"/>
-                <a:endParaRPr lang="uk-UA"/>
+                <a:endParaRPr lang="uk-UA" dirty="0">
+                  <a:latin typeface="Calibri" panose="020F0502020204030204" pitchFamily="34" charset="0"/>
+                </a:endParaRPr>
               </a:p>
             </p:txBody>
           </p:sp>
@@ -22732,7 +23195,9 @@
               <a:lstStyle/>
               <a:p>
                 <a:pPr algn="ctr"/>
-                <a:endParaRPr lang="uk-UA"/>
+                <a:endParaRPr lang="uk-UA" dirty="0">
+                  <a:latin typeface="Calibri" panose="020F0502020204030204" pitchFamily="34" charset="0"/>
+                </a:endParaRPr>
               </a:p>
             </p:txBody>
           </p:sp>
@@ -22778,7 +23243,9 @@
               <a:lstStyle/>
               <a:p>
                 <a:pPr algn="ctr"/>
-                <a:endParaRPr lang="uk-UA"/>
+                <a:endParaRPr lang="uk-UA" dirty="0">
+                  <a:latin typeface="Calibri" panose="020F0502020204030204" pitchFamily="34" charset="0"/>
+                </a:endParaRPr>
               </a:p>
             </p:txBody>
           </p:sp>
@@ -22824,7 +23291,9 @@
               <a:lstStyle/>
               <a:p>
                 <a:pPr algn="ctr"/>
-                <a:endParaRPr lang="uk-UA"/>
+                <a:endParaRPr lang="uk-UA" dirty="0">
+                  <a:latin typeface="Calibri" panose="020F0502020204030204" pitchFamily="34" charset="0"/>
+                </a:endParaRPr>
               </a:p>
             </p:txBody>
           </p:sp>
@@ -22870,7 +23339,9 @@
               <a:lstStyle/>
               <a:p>
                 <a:pPr algn="ctr"/>
-                <a:endParaRPr lang="uk-UA"/>
+                <a:endParaRPr lang="uk-UA" dirty="0">
+                  <a:latin typeface="Calibri" panose="020F0502020204030204" pitchFamily="34" charset="0"/>
+                </a:endParaRPr>
               </a:p>
             </p:txBody>
           </p:sp>
@@ -22916,7 +23387,9 @@
               <a:lstStyle/>
               <a:p>
                 <a:pPr algn="ctr"/>
-                <a:endParaRPr lang="uk-UA"/>
+                <a:endParaRPr lang="uk-UA" dirty="0">
+                  <a:latin typeface="Calibri" panose="020F0502020204030204" pitchFamily="34" charset="0"/>
+                </a:endParaRPr>
               </a:p>
             </p:txBody>
           </p:sp>
@@ -22962,7 +23435,9 @@
               <a:lstStyle/>
               <a:p>
                 <a:pPr algn="ctr"/>
-                <a:endParaRPr lang="uk-UA"/>
+                <a:endParaRPr lang="uk-UA" dirty="0">
+                  <a:latin typeface="Calibri" panose="020F0502020204030204" pitchFamily="34" charset="0"/>
+                </a:endParaRPr>
               </a:p>
             </p:txBody>
           </p:sp>
@@ -23008,7 +23483,9 @@
               <a:lstStyle/>
               <a:p>
                 <a:pPr algn="ctr"/>
-                <a:endParaRPr lang="uk-UA"/>
+                <a:endParaRPr lang="uk-UA" dirty="0">
+                  <a:latin typeface="Calibri" panose="020F0502020204030204" pitchFamily="34" charset="0"/>
+                </a:endParaRPr>
               </a:p>
             </p:txBody>
           </p:sp>
@@ -23054,7 +23531,9 @@
               <a:lstStyle/>
               <a:p>
                 <a:pPr algn="ctr"/>
-                <a:endParaRPr lang="uk-UA"/>
+                <a:endParaRPr lang="uk-UA" dirty="0">
+                  <a:latin typeface="Calibri" panose="020F0502020204030204" pitchFamily="34" charset="0"/>
+                </a:endParaRPr>
               </a:p>
             </p:txBody>
           </p:sp>
@@ -23100,7 +23579,9 @@
               <a:lstStyle/>
               <a:p>
                 <a:pPr algn="ctr"/>
-                <a:endParaRPr lang="uk-UA"/>
+                <a:endParaRPr lang="uk-UA" dirty="0">
+                  <a:latin typeface="Calibri" panose="020F0502020204030204" pitchFamily="34" charset="0"/>
+                </a:endParaRPr>
               </a:p>
             </p:txBody>
           </p:sp>
@@ -23146,7 +23627,9 @@
               <a:lstStyle/>
               <a:p>
                 <a:pPr algn="ctr"/>
-                <a:endParaRPr lang="uk-UA"/>
+                <a:endParaRPr lang="uk-UA" dirty="0">
+                  <a:latin typeface="Calibri" panose="020F0502020204030204" pitchFamily="34" charset="0"/>
+                </a:endParaRPr>
               </a:p>
             </p:txBody>
           </p:sp>
@@ -23192,7 +23675,9 @@
               <a:lstStyle/>
               <a:p>
                 <a:pPr algn="ctr"/>
-                <a:endParaRPr lang="uk-UA"/>
+                <a:endParaRPr lang="uk-UA" dirty="0">
+                  <a:latin typeface="Calibri" panose="020F0502020204030204" pitchFamily="34" charset="0"/>
+                </a:endParaRPr>
               </a:p>
             </p:txBody>
           </p:sp>
@@ -23238,7 +23723,9 @@
               <a:lstStyle/>
               <a:p>
                 <a:pPr algn="ctr"/>
-                <a:endParaRPr lang="uk-UA"/>
+                <a:endParaRPr lang="uk-UA" dirty="0">
+                  <a:latin typeface="Calibri" panose="020F0502020204030204" pitchFamily="34" charset="0"/>
+                </a:endParaRPr>
               </a:p>
             </p:txBody>
           </p:sp>
@@ -23284,7 +23771,9 @@
               <a:lstStyle/>
               <a:p>
                 <a:pPr algn="ctr"/>
-                <a:endParaRPr lang="uk-UA"/>
+                <a:endParaRPr lang="uk-UA" dirty="0">
+                  <a:latin typeface="Calibri" panose="020F0502020204030204" pitchFamily="34" charset="0"/>
+                </a:endParaRPr>
               </a:p>
             </p:txBody>
           </p:sp>
@@ -23330,7 +23819,9 @@
               <a:lstStyle/>
               <a:p>
                 <a:pPr algn="ctr"/>
-                <a:endParaRPr lang="uk-UA"/>
+                <a:endParaRPr lang="uk-UA" dirty="0">
+                  <a:latin typeface="Calibri" panose="020F0502020204030204" pitchFamily="34" charset="0"/>
+                </a:endParaRPr>
               </a:p>
             </p:txBody>
           </p:sp>
@@ -23376,7 +23867,9 @@
               <a:lstStyle/>
               <a:p>
                 <a:pPr algn="ctr"/>
-                <a:endParaRPr lang="uk-UA"/>
+                <a:endParaRPr lang="uk-UA" dirty="0">
+                  <a:latin typeface="Calibri" panose="020F0502020204030204" pitchFamily="34" charset="0"/>
+                </a:endParaRPr>
               </a:p>
             </p:txBody>
           </p:sp>
@@ -23422,7 +23915,9 @@
               <a:lstStyle/>
               <a:p>
                 <a:pPr algn="ctr"/>
-                <a:endParaRPr lang="uk-UA"/>
+                <a:endParaRPr lang="uk-UA" dirty="0">
+                  <a:latin typeface="Calibri" panose="020F0502020204030204" pitchFamily="34" charset="0"/>
+                </a:endParaRPr>
               </a:p>
             </p:txBody>
           </p:sp>
@@ -23468,7 +23963,9 @@
               <a:lstStyle/>
               <a:p>
                 <a:pPr algn="ctr"/>
-                <a:endParaRPr lang="uk-UA"/>
+                <a:endParaRPr lang="uk-UA" dirty="0">
+                  <a:latin typeface="Calibri" panose="020F0502020204030204" pitchFamily="34" charset="0"/>
+                </a:endParaRPr>
               </a:p>
             </p:txBody>
           </p:sp>
@@ -23502,10 +23999,14 @@
               <a:p>
                 <a:pPr algn="r"/>
                 <a:r>
-                  <a:rPr lang="en-US" dirty="0"/>
+                  <a:rPr lang="en-US" dirty="0">
+                    <a:latin typeface="Calibri" panose="020F0502020204030204" pitchFamily="34" charset="0"/>
+                  </a:rPr>
                   <a:t>y=1</a:t>
                 </a:r>
-                <a:endParaRPr lang="uk-UA" dirty="0"/>
+                <a:endParaRPr lang="uk-UA" dirty="0">
+                  <a:latin typeface="Calibri" panose="020F0502020204030204" pitchFamily="34" charset="0"/>
+                </a:endParaRPr>
               </a:p>
             </p:txBody>
           </p:sp>
@@ -23539,10 +24040,14 @@
               <a:p>
                 <a:pPr algn="r"/>
                 <a:r>
-                  <a:rPr lang="en-US" dirty="0"/>
+                  <a:rPr lang="en-US" dirty="0">
+                    <a:latin typeface="Calibri" panose="020F0502020204030204" pitchFamily="34" charset="0"/>
+                  </a:rPr>
                   <a:t>y=0</a:t>
                 </a:r>
-                <a:endParaRPr lang="uk-UA" dirty="0"/>
+                <a:endParaRPr lang="uk-UA" dirty="0">
+                  <a:latin typeface="Calibri" panose="020F0502020204030204" pitchFamily="34" charset="0"/>
+                </a:endParaRPr>
               </a:p>
             </p:txBody>
           </p:sp>
@@ -23580,6 +24085,7 @@
                     <a:solidFill>
                       <a:srgbClr val="000000"/>
                     </a:solidFill>
+                    <a:latin typeface="Calibri" panose="020F0502020204030204" pitchFamily="34" charset="0"/>
                   </a:rPr>
                   <a:t>Y</a:t>
                 </a:r>
@@ -23587,6 +24093,7 @@
                   <a:solidFill>
                     <a:srgbClr val="000000"/>
                   </a:solidFill>
+                  <a:latin typeface="Calibri" panose="020F0502020204030204" pitchFamily="34" charset="0"/>
                 </a:endParaRPr>
               </a:p>
             </p:txBody>
@@ -23625,6 +24132,7 @@
                     <a:solidFill>
                       <a:srgbClr val="000000"/>
                     </a:solidFill>
+                    <a:latin typeface="Calibri" panose="020F0502020204030204" pitchFamily="34" charset="0"/>
                   </a:rPr>
                   <a:t>X</a:t>
                 </a:r>
@@ -23632,6 +24140,7 @@
                   <a:solidFill>
                     <a:srgbClr val="000000"/>
                   </a:solidFill>
+                  <a:latin typeface="Calibri" panose="020F0502020204030204" pitchFamily="34" charset="0"/>
                 </a:endParaRPr>
               </a:p>
             </p:txBody>
@@ -23670,6 +24179,7 @@
                     <a:solidFill>
                       <a:srgbClr val="007B8C"/>
                     </a:solidFill>
+                    <a:latin typeface="Calibri" panose="020F0502020204030204" pitchFamily="34" charset="0"/>
                   </a:rPr>
                   <a:t>ЛОГІСТИЧНА РЕГРЕСІЯ</a:t>
                 </a:r>
@@ -23709,6 +24219,7 @@
                     <a:solidFill>
                       <a:srgbClr val="4F4F4F"/>
                     </a:solidFill>
+                    <a:latin typeface="Calibri" panose="020F0502020204030204" pitchFamily="34" charset="0"/>
                   </a:rPr>
                   <a:t>Значення </a:t>
                 </a:r>
@@ -23717,6 +24228,7 @@
                     <a:solidFill>
                       <a:srgbClr val="4F4F4F"/>
                     </a:solidFill>
+                    <a:latin typeface="Calibri" panose="020F0502020204030204" pitchFamily="34" charset="0"/>
                   </a:rPr>
                   <a:t>Y </a:t>
                 </a:r>
@@ -23725,6 +24237,7 @@
                     <a:solidFill>
                       <a:srgbClr val="4F4F4F"/>
                     </a:solidFill>
+                    <a:latin typeface="Calibri" panose="020F0502020204030204" pitchFamily="34" charset="0"/>
                   </a:rPr>
                   <a:t>не можуть виходити за межі </a:t>
                 </a:r>
@@ -23733,6 +24246,7 @@
                     <a:solidFill>
                       <a:srgbClr val="4F4F4F"/>
                     </a:solidFill>
+                    <a:latin typeface="Calibri" panose="020F0502020204030204" pitchFamily="34" charset="0"/>
                   </a:rPr>
                   <a:t>[0;1]</a:t>
                 </a:r>
@@ -23740,6 +24254,7 @@
                   <a:solidFill>
                     <a:srgbClr val="4F4F4F"/>
                   </a:solidFill>
+                  <a:latin typeface="Calibri" panose="020F0502020204030204" pitchFamily="34" charset="0"/>
                 </a:endParaRPr>
               </a:p>
             </p:txBody>
@@ -23954,7 +24469,9 @@
           </a:lstStyle>
           <a:p>
             <a:r>
-              <a:rPr lang="uk-UA" sz="2800" dirty="0"/>
+              <a:rPr lang="uk-UA" sz="2800" dirty="0">
+                <a:latin typeface="Calibri" panose="020F0502020204030204" pitchFamily="34" charset="0"/>
+              </a:rPr>
               <a:t>у задачах бінарної класифікації</a:t>
             </a:r>
           </a:p>
@@ -24084,7 +24601,9 @@
             <a:lstStyle/>
             <a:p>
               <a:pPr algn="ctr"/>
-              <a:endParaRPr lang="uk-UA"/>
+              <a:endParaRPr lang="uk-UA" dirty="0">
+                <a:latin typeface="Calibri" panose="020F0502020204030204" pitchFamily="34" charset="0"/>
+              </a:endParaRPr>
             </a:p>
           </p:txBody>
         </p:sp>
@@ -24282,7 +24801,9 @@
               <a:lstStyle/>
               <a:p>
                 <a:pPr algn="ctr"/>
-                <a:endParaRPr lang="uk-UA"/>
+                <a:endParaRPr lang="uk-UA" dirty="0">
+                  <a:latin typeface="Calibri" panose="020F0502020204030204" pitchFamily="34" charset="0"/>
+                </a:endParaRPr>
               </a:p>
             </p:txBody>
           </p:sp>
@@ -24328,7 +24849,9 @@
               <a:lstStyle/>
               <a:p>
                 <a:pPr algn="ctr"/>
-                <a:endParaRPr lang="uk-UA"/>
+                <a:endParaRPr lang="uk-UA" dirty="0">
+                  <a:latin typeface="Calibri" panose="020F0502020204030204" pitchFamily="34" charset="0"/>
+                </a:endParaRPr>
               </a:p>
             </p:txBody>
           </p:sp>
@@ -24374,7 +24897,9 @@
               <a:lstStyle/>
               <a:p>
                 <a:pPr algn="ctr"/>
-                <a:endParaRPr lang="uk-UA"/>
+                <a:endParaRPr lang="uk-UA" dirty="0">
+                  <a:latin typeface="Calibri" panose="020F0502020204030204" pitchFamily="34" charset="0"/>
+                </a:endParaRPr>
               </a:p>
             </p:txBody>
           </p:sp>
@@ -24420,7 +24945,9 @@
               <a:lstStyle/>
               <a:p>
                 <a:pPr algn="ctr"/>
-                <a:endParaRPr lang="uk-UA"/>
+                <a:endParaRPr lang="uk-UA" dirty="0">
+                  <a:latin typeface="Calibri" panose="020F0502020204030204" pitchFamily="34" charset="0"/>
+                </a:endParaRPr>
               </a:p>
             </p:txBody>
           </p:sp>
@@ -24466,7 +24993,9 @@
               <a:lstStyle/>
               <a:p>
                 <a:pPr algn="ctr"/>
-                <a:endParaRPr lang="uk-UA"/>
+                <a:endParaRPr lang="uk-UA" dirty="0">
+                  <a:latin typeface="Calibri" panose="020F0502020204030204" pitchFamily="34" charset="0"/>
+                </a:endParaRPr>
               </a:p>
             </p:txBody>
           </p:sp>
@@ -24512,7 +25041,9 @@
               <a:lstStyle/>
               <a:p>
                 <a:pPr algn="ctr"/>
-                <a:endParaRPr lang="uk-UA"/>
+                <a:endParaRPr lang="uk-UA" dirty="0">
+                  <a:latin typeface="Calibri" panose="020F0502020204030204" pitchFamily="34" charset="0"/>
+                </a:endParaRPr>
               </a:p>
             </p:txBody>
           </p:sp>
@@ -24558,7 +25089,9 @@
               <a:lstStyle/>
               <a:p>
                 <a:pPr algn="ctr"/>
-                <a:endParaRPr lang="uk-UA"/>
+                <a:endParaRPr lang="uk-UA" dirty="0">
+                  <a:latin typeface="Calibri" panose="020F0502020204030204" pitchFamily="34" charset="0"/>
+                </a:endParaRPr>
               </a:p>
             </p:txBody>
           </p:sp>
@@ -24604,7 +25137,9 @@
               <a:lstStyle/>
               <a:p>
                 <a:pPr algn="ctr"/>
-                <a:endParaRPr lang="uk-UA"/>
+                <a:endParaRPr lang="uk-UA" dirty="0">
+                  <a:latin typeface="Calibri" panose="020F0502020204030204" pitchFamily="34" charset="0"/>
+                </a:endParaRPr>
               </a:p>
             </p:txBody>
           </p:sp>
@@ -24650,7 +25185,9 @@
               <a:lstStyle/>
               <a:p>
                 <a:pPr algn="ctr"/>
-                <a:endParaRPr lang="uk-UA"/>
+                <a:endParaRPr lang="uk-UA" dirty="0">
+                  <a:latin typeface="Calibri" panose="020F0502020204030204" pitchFamily="34" charset="0"/>
+                </a:endParaRPr>
               </a:p>
             </p:txBody>
           </p:sp>
@@ -24696,7 +25233,9 @@
               <a:lstStyle/>
               <a:p>
                 <a:pPr algn="ctr"/>
-                <a:endParaRPr lang="uk-UA"/>
+                <a:endParaRPr lang="uk-UA" dirty="0">
+                  <a:latin typeface="Calibri" panose="020F0502020204030204" pitchFamily="34" charset="0"/>
+                </a:endParaRPr>
               </a:p>
             </p:txBody>
           </p:sp>
@@ -24742,7 +25281,9 @@
               <a:lstStyle/>
               <a:p>
                 <a:pPr algn="ctr"/>
-                <a:endParaRPr lang="uk-UA"/>
+                <a:endParaRPr lang="uk-UA" dirty="0">
+                  <a:latin typeface="Calibri" panose="020F0502020204030204" pitchFamily="34" charset="0"/>
+                </a:endParaRPr>
               </a:p>
             </p:txBody>
           </p:sp>
@@ -24788,7 +25329,9 @@
               <a:lstStyle/>
               <a:p>
                 <a:pPr algn="ctr"/>
-                <a:endParaRPr lang="uk-UA"/>
+                <a:endParaRPr lang="uk-UA" dirty="0">
+                  <a:latin typeface="Calibri" panose="020F0502020204030204" pitchFamily="34" charset="0"/>
+                </a:endParaRPr>
               </a:p>
             </p:txBody>
           </p:sp>
@@ -24834,7 +25377,9 @@
               <a:lstStyle/>
               <a:p>
                 <a:pPr algn="ctr"/>
-                <a:endParaRPr lang="uk-UA"/>
+                <a:endParaRPr lang="uk-UA" dirty="0">
+                  <a:latin typeface="Calibri" panose="020F0502020204030204" pitchFamily="34" charset="0"/>
+                </a:endParaRPr>
               </a:p>
             </p:txBody>
           </p:sp>
@@ -24880,7 +25425,9 @@
               <a:lstStyle/>
               <a:p>
                 <a:pPr algn="ctr"/>
-                <a:endParaRPr lang="uk-UA"/>
+                <a:endParaRPr lang="uk-UA" dirty="0">
+                  <a:latin typeface="Calibri" panose="020F0502020204030204" pitchFamily="34" charset="0"/>
+                </a:endParaRPr>
               </a:p>
             </p:txBody>
           </p:sp>
@@ -24926,7 +25473,9 @@
               <a:lstStyle/>
               <a:p>
                 <a:pPr algn="ctr"/>
-                <a:endParaRPr lang="uk-UA"/>
+                <a:endParaRPr lang="uk-UA" dirty="0">
+                  <a:latin typeface="Calibri" panose="020F0502020204030204" pitchFamily="34" charset="0"/>
+                </a:endParaRPr>
               </a:p>
             </p:txBody>
           </p:sp>
@@ -24972,7 +25521,9 @@
               <a:lstStyle/>
               <a:p>
                 <a:pPr algn="ctr"/>
-                <a:endParaRPr lang="uk-UA"/>
+                <a:endParaRPr lang="uk-UA" dirty="0">
+                  <a:latin typeface="Calibri" panose="020F0502020204030204" pitchFamily="34" charset="0"/>
+                </a:endParaRPr>
               </a:p>
             </p:txBody>
           </p:sp>
@@ -25018,7 +25569,9 @@
               <a:lstStyle/>
               <a:p>
                 <a:pPr algn="ctr"/>
-                <a:endParaRPr lang="uk-UA"/>
+                <a:endParaRPr lang="uk-UA" dirty="0">
+                  <a:latin typeface="Calibri" panose="020F0502020204030204" pitchFamily="34" charset="0"/>
+                </a:endParaRPr>
               </a:p>
             </p:txBody>
           </p:sp>
@@ -25064,7 +25617,9 @@
               <a:lstStyle/>
               <a:p>
                 <a:pPr algn="ctr"/>
-                <a:endParaRPr lang="uk-UA"/>
+                <a:endParaRPr lang="uk-UA" dirty="0">
+                  <a:latin typeface="Calibri" panose="020F0502020204030204" pitchFamily="34" charset="0"/>
+                </a:endParaRPr>
               </a:p>
             </p:txBody>
           </p:sp>
@@ -25110,7 +25665,9 @@
               <a:lstStyle/>
               <a:p>
                 <a:pPr algn="ctr"/>
-                <a:endParaRPr lang="uk-UA"/>
+                <a:endParaRPr lang="uk-UA" dirty="0">
+                  <a:latin typeface="Calibri" panose="020F0502020204030204" pitchFamily="34" charset="0"/>
+                </a:endParaRPr>
               </a:p>
             </p:txBody>
           </p:sp>
@@ -25156,7 +25713,9 @@
               <a:lstStyle/>
               <a:p>
                 <a:pPr algn="ctr"/>
-                <a:endParaRPr lang="uk-UA"/>
+                <a:endParaRPr lang="uk-UA" dirty="0">
+                  <a:latin typeface="Calibri" panose="020F0502020204030204" pitchFamily="34" charset="0"/>
+                </a:endParaRPr>
               </a:p>
             </p:txBody>
           </p:sp>
@@ -25202,7 +25761,9 @@
               <a:lstStyle/>
               <a:p>
                 <a:pPr algn="ctr"/>
-                <a:endParaRPr lang="uk-UA"/>
+                <a:endParaRPr lang="uk-UA" dirty="0">
+                  <a:latin typeface="Calibri" panose="020F0502020204030204" pitchFamily="34" charset="0"/>
+                </a:endParaRPr>
               </a:p>
             </p:txBody>
           </p:sp>
@@ -25248,7 +25809,9 @@
               <a:lstStyle/>
               <a:p>
                 <a:pPr algn="ctr"/>
-                <a:endParaRPr lang="uk-UA"/>
+                <a:endParaRPr lang="uk-UA" dirty="0">
+                  <a:latin typeface="Calibri" panose="020F0502020204030204" pitchFamily="34" charset="0"/>
+                </a:endParaRPr>
               </a:p>
             </p:txBody>
           </p:sp>
@@ -25294,7 +25857,9 @@
               <a:lstStyle/>
               <a:p>
                 <a:pPr algn="ctr"/>
-                <a:endParaRPr lang="uk-UA"/>
+                <a:endParaRPr lang="uk-UA" dirty="0">
+                  <a:latin typeface="Calibri" panose="020F0502020204030204" pitchFamily="34" charset="0"/>
+                </a:endParaRPr>
               </a:p>
             </p:txBody>
           </p:sp>
@@ -25340,7 +25905,9 @@
               <a:lstStyle/>
               <a:p>
                 <a:pPr algn="ctr"/>
-                <a:endParaRPr lang="uk-UA"/>
+                <a:endParaRPr lang="uk-UA" dirty="0">
+                  <a:latin typeface="Calibri" panose="020F0502020204030204" pitchFamily="34" charset="0"/>
+                </a:endParaRPr>
               </a:p>
             </p:txBody>
           </p:sp>
@@ -25386,7 +25953,9 @@
               <a:lstStyle/>
               <a:p>
                 <a:pPr algn="ctr"/>
-                <a:endParaRPr lang="uk-UA"/>
+                <a:endParaRPr lang="uk-UA" dirty="0">
+                  <a:latin typeface="Calibri" panose="020F0502020204030204" pitchFamily="34" charset="0"/>
+                </a:endParaRPr>
               </a:p>
             </p:txBody>
           </p:sp>
@@ -25466,10 +26035,14 @@
               <a:p>
                 <a:pPr algn="r"/>
                 <a:r>
-                  <a:rPr lang="en-US" dirty="0"/>
+                  <a:rPr lang="en-US" dirty="0">
+                    <a:latin typeface="Calibri" panose="020F0502020204030204" pitchFamily="34" charset="0"/>
+                  </a:rPr>
                   <a:t>y=1</a:t>
                 </a:r>
-                <a:endParaRPr lang="uk-UA" dirty="0"/>
+                <a:endParaRPr lang="uk-UA" dirty="0">
+                  <a:latin typeface="Calibri" panose="020F0502020204030204" pitchFamily="34" charset="0"/>
+                </a:endParaRPr>
               </a:p>
             </p:txBody>
           </p:sp>
@@ -25503,10 +26076,14 @@
               <a:p>
                 <a:pPr algn="r"/>
                 <a:r>
-                  <a:rPr lang="en-US" dirty="0"/>
+                  <a:rPr lang="en-US" dirty="0">
+                    <a:latin typeface="Calibri" panose="020F0502020204030204" pitchFamily="34" charset="0"/>
+                  </a:rPr>
                   <a:t>y=0</a:t>
                 </a:r>
-                <a:endParaRPr lang="uk-UA" dirty="0"/>
+                <a:endParaRPr lang="uk-UA" dirty="0">
+                  <a:latin typeface="Calibri" panose="020F0502020204030204" pitchFamily="34" charset="0"/>
+                </a:endParaRPr>
               </a:p>
             </p:txBody>
           </p:sp>
@@ -25544,6 +26121,7 @@
                     <a:solidFill>
                       <a:srgbClr val="000000"/>
                     </a:solidFill>
+                    <a:latin typeface="Calibri" panose="020F0502020204030204" pitchFamily="34" charset="0"/>
                   </a:rPr>
                   <a:t>Y</a:t>
                 </a:r>
@@ -25551,6 +26129,7 @@
                   <a:solidFill>
                     <a:srgbClr val="000000"/>
                   </a:solidFill>
+                  <a:latin typeface="Calibri" panose="020F0502020204030204" pitchFamily="34" charset="0"/>
                 </a:endParaRPr>
               </a:p>
             </p:txBody>
@@ -25589,6 +26168,7 @@
                     <a:solidFill>
                       <a:srgbClr val="000000"/>
                     </a:solidFill>
+                    <a:latin typeface="Calibri" panose="020F0502020204030204" pitchFamily="34" charset="0"/>
                   </a:rPr>
                   <a:t>X</a:t>
                 </a:r>
@@ -25596,12 +26176,13 @@
                   <a:solidFill>
                     <a:srgbClr val="000000"/>
                   </a:solidFill>
+                  <a:latin typeface="Calibri" panose="020F0502020204030204" pitchFamily="34" charset="0"/>
                 </a:endParaRPr>
               </a:p>
             </p:txBody>
           </p:sp>
-          <mc:AlternateContent xmlns:mc="http://schemas.openxmlformats.org/markup-compatibility/2006" xmlns:a14="http://schemas.microsoft.com/office/drawing/2010/main">
-            <mc:Choice Requires="a14">
+          <mc:AlternateContent xmlns:mc="http://schemas.openxmlformats.org/markup-compatibility/2006">
+            <mc:Choice xmlns:a14="http://schemas.microsoft.com/office/drawing/2010/main" Requires="a14">
               <p:sp>
                 <p:nvSpPr>
                   <p:cNvPr id="40" name="TextBox 39">
@@ -25635,6 +26216,7 @@
                         <a:solidFill>
                           <a:srgbClr val="007B8C"/>
                         </a:solidFill>
+                        <a:latin typeface="Calibri" panose="020F0502020204030204" pitchFamily="34" charset="0"/>
                       </a:rPr>
                       <a:t>Linear Regression: </a:t>
                     </a:r>
@@ -25750,12 +26332,13 @@
                       <a:solidFill>
                         <a:srgbClr val="007B8C"/>
                       </a:solidFill>
+                      <a:latin typeface="Calibri" panose="020F0502020204030204" pitchFamily="34" charset="0"/>
                     </a:endParaRPr>
                   </a:p>
                 </p:txBody>
               </p:sp>
             </mc:Choice>
-            <mc:Fallback xmlns="">
+            <mc:Fallback>
               <p:sp>
                 <p:nvSpPr>
                   <p:cNvPr id="40" name="TextBox 39">
@@ -25781,7 +26364,7 @@
                   <a:blipFill>
                     <a:blip r:embed="rId3"/>
                     <a:stretch>
-                      <a:fillRect l="-431" b="-14545"/>
+                      <a:fillRect l="-431" b="-16364"/>
                     </a:stretch>
                   </a:blipFill>
                 </p:spPr>
@@ -25790,7 +26373,7 @@
                   <a:lstStyle/>
                   <a:p>
                     <a:r>
-                      <a:rPr lang="uk-UA">
+                      <a:rPr lang="en-US">
                         <a:noFill/>
                       </a:rPr>
                       <a:t> </a:t>
@@ -25800,8 +26383,8 @@
               </p:sp>
             </mc:Fallback>
           </mc:AlternateContent>
-          <mc:AlternateContent xmlns:mc="http://schemas.openxmlformats.org/markup-compatibility/2006" xmlns:a14="http://schemas.microsoft.com/office/drawing/2010/main">
-            <mc:Choice Requires="a14">
+          <mc:AlternateContent xmlns:mc="http://schemas.openxmlformats.org/markup-compatibility/2006">
+            <mc:Choice xmlns:a14="http://schemas.microsoft.com/office/drawing/2010/main" Requires="a14">
               <p:sp>
                 <p:nvSpPr>
                   <p:cNvPr id="82" name="TextBox 81">
@@ -25836,6 +26419,7 @@
                         <a:solidFill>
                           <a:srgbClr val="007B8C"/>
                         </a:solidFill>
+                        <a:latin typeface="Calibri" panose="020F0502020204030204" pitchFamily="34" charset="0"/>
                       </a:rPr>
                       <a:t>Logistic Regression: </a:t>
                     </a:r>
@@ -26042,12 +26626,13 @@
                       <a:solidFill>
                         <a:srgbClr val="007B8C"/>
                       </a:solidFill>
+                      <a:latin typeface="Calibri" panose="020F0502020204030204" pitchFamily="34" charset="0"/>
                     </a:endParaRPr>
                   </a:p>
                 </p:txBody>
               </p:sp>
             </mc:Choice>
-            <mc:Fallback xmlns="">
+            <mc:Fallback>
               <p:sp>
                 <p:nvSpPr>
                   <p:cNvPr id="82" name="TextBox 81">
@@ -26073,7 +26658,7 @@
                   <a:blipFill>
                     <a:blip r:embed="rId4"/>
                     <a:stretch>
-                      <a:fillRect t="-2190"/>
+                      <a:fillRect t="-730"/>
                     </a:stretch>
                   </a:blipFill>
                 </p:spPr>
@@ -26082,7 +26667,7 @@
                   <a:lstStyle/>
                   <a:p>
                     <a:r>
-                      <a:rPr lang="uk-UA">
+                      <a:rPr lang="en-US">
                         <a:noFill/>
                       </a:rPr>
                       <a:t> </a:t>
@@ -26866,7 +27451,9 @@
                     <a:p>
                       <a:pPr algn="ctr"/>
                       <a:r>
-                        <a:rPr lang="uk-UA" sz="1400" dirty="0"/>
+                        <a:rPr lang="uk-UA" sz="1400" dirty="0">
+                          <a:latin typeface="Calibri" panose="020F0502020204030204" pitchFamily="34" charset="0"/>
+                        </a:rPr>
                         <a:t>№</a:t>
                       </a:r>
                     </a:p>
@@ -26880,7 +27467,9 @@
                     <a:p>
                       <a:pPr algn="ctr"/>
                       <a:r>
-                        <a:rPr lang="en-US" sz="1400" dirty="0"/>
+                        <a:rPr lang="en-US" sz="1400" dirty="0">
+                          <a:latin typeface="Calibri" panose="020F0502020204030204" pitchFamily="34" charset="0"/>
+                        </a:rPr>
                         <a:t>Salary</a:t>
                       </a:r>
                       <a:endParaRPr lang="uk-UA" sz="1400" dirty="0"/>
@@ -26895,7 +27484,9 @@
                     <a:p>
                       <a:pPr algn="ctr"/>
                       <a:r>
-                        <a:rPr lang="en-US" sz="1400" dirty="0"/>
+                        <a:rPr lang="en-US" sz="1400" dirty="0">
+                          <a:latin typeface="Calibri" panose="020F0502020204030204" pitchFamily="34" charset="0"/>
+                        </a:rPr>
                         <a:t>Default</a:t>
                       </a:r>
                       <a:endParaRPr lang="uk-UA" sz="1400" dirty="0"/>
@@ -26917,7 +27508,9 @@
                     <a:p>
                       <a:pPr algn="ctr"/>
                       <a:r>
-                        <a:rPr lang="en-US" sz="1400" dirty="0"/>
+                        <a:rPr lang="en-US" sz="1400" dirty="0">
+                          <a:latin typeface="Calibri" panose="020F0502020204030204" pitchFamily="34" charset="0"/>
+                        </a:rPr>
                         <a:t>1</a:t>
                       </a:r>
                       <a:endParaRPr lang="uk-UA" sz="1400" dirty="0"/>
@@ -26932,7 +27525,9 @@
                     <a:p>
                       <a:pPr algn="ctr"/>
                       <a:r>
-                        <a:rPr lang="en-US" sz="1400" dirty="0"/>
+                        <a:rPr lang="en-US" sz="1400" dirty="0">
+                          <a:latin typeface="Calibri" panose="020F0502020204030204" pitchFamily="34" charset="0"/>
+                        </a:rPr>
                         <a:t>5000</a:t>
                       </a:r>
                       <a:endParaRPr lang="uk-UA" sz="1400" dirty="0"/>
@@ -26947,7 +27542,9 @@
                     <a:p>
                       <a:pPr algn="ctr"/>
                       <a:r>
-                        <a:rPr lang="en-US" sz="1400" dirty="0"/>
+                        <a:rPr lang="en-US" sz="1400" dirty="0">
+                          <a:latin typeface="Calibri" panose="020F0502020204030204" pitchFamily="34" charset="0"/>
+                        </a:rPr>
                         <a:t>“yes”</a:t>
                       </a:r>
                       <a:endParaRPr lang="uk-UA" sz="1400" dirty="0"/>
@@ -26969,7 +27566,9 @@
                     <a:p>
                       <a:pPr algn="ctr"/>
                       <a:r>
-                        <a:rPr lang="en-US" sz="1400" dirty="0"/>
+                        <a:rPr lang="en-US" sz="1400" dirty="0">
+                          <a:latin typeface="Calibri" panose="020F0502020204030204" pitchFamily="34" charset="0"/>
+                        </a:rPr>
                         <a:t>2</a:t>
                       </a:r>
                       <a:endParaRPr lang="uk-UA" sz="1400" dirty="0"/>
@@ -26984,7 +27583,9 @@
                     <a:p>
                       <a:pPr algn="ctr"/>
                       <a:r>
-                        <a:rPr lang="en-US" sz="1400" dirty="0"/>
+                        <a:rPr lang="en-US" sz="1400" dirty="0">
+                          <a:latin typeface="Calibri" panose="020F0502020204030204" pitchFamily="34" charset="0"/>
+                        </a:rPr>
                         <a:t>7000</a:t>
                       </a:r>
                       <a:endParaRPr lang="uk-UA" sz="1400" dirty="0"/>
@@ -26999,7 +27600,9 @@
                     <a:p>
                       <a:pPr algn="ctr"/>
                       <a:r>
-                        <a:rPr lang="en-US" sz="1400" dirty="0"/>
+                        <a:rPr lang="en-US" sz="1400" dirty="0">
+                          <a:latin typeface="Calibri" panose="020F0502020204030204" pitchFamily="34" charset="0"/>
+                        </a:rPr>
                         <a:t>“no”</a:t>
                       </a:r>
                       <a:endParaRPr lang="uk-UA" sz="1400" dirty="0"/>
@@ -27021,7 +27624,9 @@
                     <a:p>
                       <a:pPr algn="ctr"/>
                       <a:r>
-                        <a:rPr lang="en-US" sz="1400" dirty="0"/>
+                        <a:rPr lang="en-US" sz="1400" dirty="0">
+                          <a:latin typeface="Calibri" panose="020F0502020204030204" pitchFamily="34" charset="0"/>
+                        </a:rPr>
                         <a:t>3</a:t>
                       </a:r>
                       <a:endParaRPr lang="uk-UA" sz="1400" dirty="0"/>
@@ -27036,7 +27641,9 @@
                     <a:p>
                       <a:pPr algn="ctr"/>
                       <a:r>
-                        <a:rPr lang="en-US" sz="1400" dirty="0"/>
+                        <a:rPr lang="en-US" sz="1400" dirty="0">
+                          <a:latin typeface="Calibri" panose="020F0502020204030204" pitchFamily="34" charset="0"/>
+                        </a:rPr>
                         <a:t>3200</a:t>
                       </a:r>
                       <a:endParaRPr lang="uk-UA" sz="1400" dirty="0"/>
@@ -27051,7 +27658,9 @@
                     <a:p>
                       <a:pPr algn="ctr"/>
                       <a:r>
-                        <a:rPr lang="en-US" sz="1400" dirty="0"/>
+                        <a:rPr lang="en-US" sz="1400" dirty="0">
+                          <a:latin typeface="Calibri" panose="020F0502020204030204" pitchFamily="34" charset="0"/>
+                        </a:rPr>
                         <a:t>“no”</a:t>
                       </a:r>
                       <a:endParaRPr lang="uk-UA" sz="1400" dirty="0"/>
@@ -27073,7 +27682,9 @@
                     <a:p>
                       <a:pPr algn="ctr"/>
                       <a:r>
-                        <a:rPr lang="en-US" sz="1400" dirty="0"/>
+                        <a:rPr lang="en-US" sz="1400" dirty="0">
+                          <a:latin typeface="Calibri" panose="020F0502020204030204" pitchFamily="34" charset="0"/>
+                        </a:rPr>
                         <a:t>4</a:t>
                       </a:r>
                       <a:endParaRPr lang="uk-UA" sz="1400" dirty="0"/>
@@ -27088,7 +27699,9 @@
                     <a:p>
                       <a:pPr algn="ctr"/>
                       <a:r>
-                        <a:rPr lang="en-US" sz="1400" dirty="0"/>
+                        <a:rPr lang="en-US" sz="1400" dirty="0">
+                          <a:latin typeface="Calibri" panose="020F0502020204030204" pitchFamily="34" charset="0"/>
+                        </a:rPr>
                         <a:t>7400</a:t>
                       </a:r>
                       <a:endParaRPr lang="uk-UA" sz="1400" dirty="0"/>
@@ -27103,7 +27716,9 @@
                     <a:p>
                       <a:pPr algn="ctr"/>
                       <a:r>
-                        <a:rPr lang="en-US" sz="1400" dirty="0"/>
+                        <a:rPr lang="en-US" sz="1400" dirty="0">
+                          <a:latin typeface="Calibri" panose="020F0502020204030204" pitchFamily="34" charset="0"/>
+                        </a:rPr>
                         <a:t>“yes”</a:t>
                       </a:r>
                       <a:endParaRPr lang="uk-UA" sz="1400" dirty="0"/>
@@ -27125,7 +27740,9 @@
                     <a:p>
                       <a:pPr algn="ctr"/>
                       <a:r>
-                        <a:rPr lang="en-US" sz="1400" dirty="0"/>
+                        <a:rPr lang="en-US" sz="1400" dirty="0">
+                          <a:latin typeface="Calibri" panose="020F0502020204030204" pitchFamily="34" charset="0"/>
+                        </a:rPr>
                         <a:t>5</a:t>
                       </a:r>
                       <a:endParaRPr lang="uk-UA" sz="1400" dirty="0"/>
@@ -27140,7 +27757,9 @@
                     <a:p>
                       <a:pPr algn="ctr"/>
                       <a:r>
-                        <a:rPr lang="en-US" sz="1400" dirty="0"/>
+                        <a:rPr lang="en-US" sz="1400" dirty="0">
+                          <a:latin typeface="Calibri" panose="020F0502020204030204" pitchFamily="34" charset="0"/>
+                        </a:rPr>
                         <a:t>3600</a:t>
                       </a:r>
                       <a:endParaRPr lang="uk-UA" sz="1400" dirty="0"/>
@@ -27155,7 +27774,9 @@
                     <a:p>
                       <a:pPr algn="ctr"/>
                       <a:r>
-                        <a:rPr lang="en-US" sz="1400" dirty="0"/>
+                        <a:rPr lang="en-US" sz="1400" dirty="0">
+                          <a:latin typeface="Calibri" panose="020F0502020204030204" pitchFamily="34" charset="0"/>
+                        </a:rPr>
                         <a:t>“yes”</a:t>
                       </a:r>
                       <a:endParaRPr lang="uk-UA" sz="1400" dirty="0"/>
@@ -27177,7 +27798,9 @@
                     <a:p>
                       <a:pPr algn="ctr"/>
                       <a:r>
-                        <a:rPr lang="en-US" sz="1400" dirty="0"/>
+                        <a:rPr lang="en-US" sz="1400" dirty="0">
+                          <a:latin typeface="Calibri" panose="020F0502020204030204" pitchFamily="34" charset="0"/>
+                        </a:rPr>
                         <a:t>6</a:t>
                       </a:r>
                       <a:endParaRPr lang="uk-UA" sz="1400" dirty="0"/>
@@ -27192,7 +27815,9 @@
                     <a:p>
                       <a:pPr algn="ctr"/>
                       <a:r>
-                        <a:rPr lang="en-US" sz="1400" dirty="0"/>
+                        <a:rPr lang="en-US" sz="1400" dirty="0">
+                          <a:latin typeface="Calibri" panose="020F0502020204030204" pitchFamily="34" charset="0"/>
+                        </a:rPr>
                         <a:t>4300</a:t>
                       </a:r>
                       <a:endParaRPr lang="uk-UA" sz="1400" dirty="0"/>
@@ -27207,7 +27832,9 @@
                     <a:p>
                       <a:pPr algn="ctr"/>
                       <a:r>
-                        <a:rPr lang="en-US" sz="1400" dirty="0"/>
+                        <a:rPr lang="en-US" sz="1400" dirty="0">
+                          <a:latin typeface="Calibri" panose="020F0502020204030204" pitchFamily="34" charset="0"/>
+                        </a:rPr>
                         <a:t>“no”</a:t>
                       </a:r>
                       <a:endParaRPr lang="uk-UA" sz="1400" dirty="0"/>
@@ -27286,7 +27913,9 @@
                     <a:p>
                       <a:pPr algn="ctr"/>
                       <a:r>
-                        <a:rPr lang="uk-UA" sz="1400" dirty="0"/>
+                        <a:rPr lang="uk-UA" sz="1400" dirty="0">
+                          <a:latin typeface="Calibri" panose="020F0502020204030204" pitchFamily="34" charset="0"/>
+                        </a:rPr>
                         <a:t>№</a:t>
                       </a:r>
                     </a:p>
@@ -27300,7 +27929,9 @@
                     <a:p>
                       <a:pPr algn="ctr"/>
                       <a:r>
-                        <a:rPr lang="en-US" sz="1400" dirty="0"/>
+                        <a:rPr lang="en-US" sz="1400" dirty="0">
+                          <a:latin typeface="Calibri" panose="020F0502020204030204" pitchFamily="34" charset="0"/>
+                        </a:rPr>
                         <a:t>Salary</a:t>
                       </a:r>
                       <a:endParaRPr lang="uk-UA" sz="1400" dirty="0"/>
@@ -27315,7 +27946,9 @@
                     <a:p>
                       <a:pPr algn="ctr"/>
                       <a:r>
-                        <a:rPr lang="en-US" sz="1400" dirty="0"/>
+                        <a:rPr lang="en-US" sz="1400" dirty="0">
+                          <a:latin typeface="Calibri" panose="020F0502020204030204" pitchFamily="34" charset="0"/>
+                        </a:rPr>
                         <a:t>Default</a:t>
                       </a:r>
                       <a:endParaRPr lang="uk-UA" sz="1400" dirty="0"/>
@@ -27337,7 +27970,9 @@
                     <a:p>
                       <a:pPr algn="ctr"/>
                       <a:r>
-                        <a:rPr lang="en-US" sz="1400" dirty="0"/>
+                        <a:rPr lang="en-US" sz="1400" dirty="0">
+                          <a:latin typeface="Calibri" panose="020F0502020204030204" pitchFamily="34" charset="0"/>
+                        </a:rPr>
                         <a:t>1</a:t>
                       </a:r>
                       <a:endParaRPr lang="uk-UA" sz="1400" dirty="0"/>
@@ -27352,7 +27987,9 @@
                     <a:p>
                       <a:pPr algn="ctr"/>
                       <a:r>
-                        <a:rPr lang="en-US" sz="1400" dirty="0"/>
+                        <a:rPr lang="en-US" sz="1400" dirty="0">
+                          <a:latin typeface="Calibri" panose="020F0502020204030204" pitchFamily="34" charset="0"/>
+                        </a:rPr>
                         <a:t>5000</a:t>
                       </a:r>
                       <a:endParaRPr lang="uk-UA" sz="1400" dirty="0"/>
@@ -27367,7 +28004,9 @@
                     <a:p>
                       <a:pPr algn="ctr"/>
                       <a:r>
-                        <a:rPr lang="en-US" sz="1400" dirty="0"/>
+                        <a:rPr lang="en-US" sz="1400" dirty="0">
+                          <a:latin typeface="Calibri" panose="020F0502020204030204" pitchFamily="34" charset="0"/>
+                        </a:rPr>
                         <a:t>1</a:t>
                       </a:r>
                       <a:endParaRPr lang="uk-UA" sz="1400" dirty="0"/>
@@ -27389,7 +28028,9 @@
                     <a:p>
                       <a:pPr algn="ctr"/>
                       <a:r>
-                        <a:rPr lang="en-US" sz="1400" dirty="0"/>
+                        <a:rPr lang="en-US" sz="1400" dirty="0">
+                          <a:latin typeface="Calibri" panose="020F0502020204030204" pitchFamily="34" charset="0"/>
+                        </a:rPr>
                         <a:t>2</a:t>
                       </a:r>
                       <a:endParaRPr lang="uk-UA" sz="1400" dirty="0"/>
@@ -27404,7 +28045,9 @@
                     <a:p>
                       <a:pPr algn="ctr"/>
                       <a:r>
-                        <a:rPr lang="en-US" sz="1400" dirty="0"/>
+                        <a:rPr lang="en-US" sz="1400" dirty="0">
+                          <a:latin typeface="Calibri" panose="020F0502020204030204" pitchFamily="34" charset="0"/>
+                        </a:rPr>
                         <a:t>7000</a:t>
                       </a:r>
                       <a:endParaRPr lang="uk-UA" sz="1400" dirty="0"/>
@@ -27419,7 +28062,9 @@
                     <a:p>
                       <a:pPr algn="ctr"/>
                       <a:r>
-                        <a:rPr lang="en-US" sz="1400" dirty="0"/>
+                        <a:rPr lang="en-US" sz="1400" dirty="0">
+                          <a:latin typeface="Calibri" panose="020F0502020204030204" pitchFamily="34" charset="0"/>
+                        </a:rPr>
                         <a:t>0</a:t>
                       </a:r>
                       <a:endParaRPr lang="uk-UA" sz="1400" dirty="0"/>
@@ -27441,7 +28086,9 @@
                     <a:p>
                       <a:pPr algn="ctr"/>
                       <a:r>
-                        <a:rPr lang="en-US" sz="1400" dirty="0"/>
+                        <a:rPr lang="en-US" sz="1400" dirty="0">
+                          <a:latin typeface="Calibri" panose="020F0502020204030204" pitchFamily="34" charset="0"/>
+                        </a:rPr>
                         <a:t>3</a:t>
                       </a:r>
                       <a:endParaRPr lang="uk-UA" sz="1400" dirty="0"/>
@@ -27456,7 +28103,9 @@
                     <a:p>
                       <a:pPr algn="ctr"/>
                       <a:r>
-                        <a:rPr lang="en-US" sz="1400" dirty="0"/>
+                        <a:rPr lang="en-US" sz="1400" dirty="0">
+                          <a:latin typeface="Calibri" panose="020F0502020204030204" pitchFamily="34" charset="0"/>
+                        </a:rPr>
                         <a:t>3200</a:t>
                       </a:r>
                       <a:endParaRPr lang="uk-UA" sz="1400" dirty="0"/>
@@ -27471,7 +28120,9 @@
                     <a:p>
                       <a:pPr algn="ctr"/>
                       <a:r>
-                        <a:rPr lang="en-US" sz="1400" dirty="0"/>
+                        <a:rPr lang="en-US" sz="1400" dirty="0">
+                          <a:latin typeface="Calibri" panose="020F0502020204030204" pitchFamily="34" charset="0"/>
+                        </a:rPr>
                         <a:t>0</a:t>
                       </a:r>
                       <a:endParaRPr lang="uk-UA" sz="1400" dirty="0"/>
@@ -27493,7 +28144,9 @@
                     <a:p>
                       <a:pPr algn="ctr"/>
                       <a:r>
-                        <a:rPr lang="en-US" sz="1400" dirty="0"/>
+                        <a:rPr lang="en-US" sz="1400" dirty="0">
+                          <a:latin typeface="Calibri" panose="020F0502020204030204" pitchFamily="34" charset="0"/>
+                        </a:rPr>
                         <a:t>4</a:t>
                       </a:r>
                       <a:endParaRPr lang="uk-UA" sz="1400" dirty="0"/>
@@ -27508,7 +28161,9 @@
                     <a:p>
                       <a:pPr algn="ctr"/>
                       <a:r>
-                        <a:rPr lang="en-US" sz="1400" dirty="0"/>
+                        <a:rPr lang="en-US" sz="1400" dirty="0">
+                          <a:latin typeface="Calibri" panose="020F0502020204030204" pitchFamily="34" charset="0"/>
+                        </a:rPr>
                         <a:t>7400</a:t>
                       </a:r>
                       <a:endParaRPr lang="uk-UA" sz="1400" dirty="0"/>
@@ -27523,7 +28178,9 @@
                     <a:p>
                       <a:pPr algn="ctr"/>
                       <a:r>
-                        <a:rPr lang="en-US" sz="1400" dirty="0"/>
+                        <a:rPr lang="en-US" sz="1400" dirty="0">
+                          <a:latin typeface="Calibri" panose="020F0502020204030204" pitchFamily="34" charset="0"/>
+                        </a:rPr>
                         <a:t>1</a:t>
                       </a:r>
                       <a:endParaRPr lang="uk-UA" sz="1400" dirty="0"/>
@@ -27545,7 +28202,9 @@
                     <a:p>
                       <a:pPr algn="ctr"/>
                       <a:r>
-                        <a:rPr lang="en-US" sz="1400" dirty="0"/>
+                        <a:rPr lang="en-US" sz="1400" dirty="0">
+                          <a:latin typeface="Calibri" panose="020F0502020204030204" pitchFamily="34" charset="0"/>
+                        </a:rPr>
                         <a:t>5</a:t>
                       </a:r>
                       <a:endParaRPr lang="uk-UA" sz="1400" dirty="0"/>
@@ -27560,7 +28219,9 @@
                     <a:p>
                       <a:pPr algn="ctr"/>
                       <a:r>
-                        <a:rPr lang="en-US" sz="1400" dirty="0"/>
+                        <a:rPr lang="en-US" sz="1400" dirty="0">
+                          <a:latin typeface="Calibri" panose="020F0502020204030204" pitchFamily="34" charset="0"/>
+                        </a:rPr>
                         <a:t>3600</a:t>
                       </a:r>
                       <a:endParaRPr lang="uk-UA" sz="1400" dirty="0"/>
@@ -27575,7 +28236,9 @@
                     <a:p>
                       <a:pPr algn="ctr"/>
                       <a:r>
-                        <a:rPr lang="en-US" sz="1400" dirty="0"/>
+                        <a:rPr lang="en-US" sz="1400" dirty="0">
+                          <a:latin typeface="Calibri" panose="020F0502020204030204" pitchFamily="34" charset="0"/>
+                        </a:rPr>
                         <a:t>1</a:t>
                       </a:r>
                       <a:endParaRPr lang="uk-UA" sz="1400" dirty="0"/>
@@ -27597,7 +28260,9 @@
                     <a:p>
                       <a:pPr algn="ctr"/>
                       <a:r>
-                        <a:rPr lang="en-US" sz="1400" dirty="0"/>
+                        <a:rPr lang="en-US" sz="1400" dirty="0">
+                          <a:latin typeface="Calibri" panose="020F0502020204030204" pitchFamily="34" charset="0"/>
+                        </a:rPr>
                         <a:t>6</a:t>
                       </a:r>
                       <a:endParaRPr lang="uk-UA" sz="1400" dirty="0"/>
@@ -27612,7 +28277,9 @@
                     <a:p>
                       <a:pPr algn="ctr"/>
                       <a:r>
-                        <a:rPr lang="en-US" sz="1400" dirty="0"/>
+                        <a:rPr lang="en-US" sz="1400" dirty="0">
+                          <a:latin typeface="Calibri" panose="020F0502020204030204" pitchFamily="34" charset="0"/>
+                        </a:rPr>
                         <a:t>4300</a:t>
                       </a:r>
                       <a:endParaRPr lang="uk-UA" sz="1400" dirty="0"/>
@@ -27627,7 +28294,9 @@
                     <a:p>
                       <a:pPr algn="ctr"/>
                       <a:r>
-                        <a:rPr lang="en-US" sz="1400" dirty="0"/>
+                        <a:rPr lang="en-US" sz="1400" dirty="0">
+                          <a:latin typeface="Calibri" panose="020F0502020204030204" pitchFamily="34" charset="0"/>
+                        </a:rPr>
                         <a:t>0</a:t>
                       </a:r>
                       <a:endParaRPr lang="uk-UA" sz="1400" dirty="0"/>
@@ -27687,7 +28356,9 @@
           <a:lstStyle/>
           <a:p>
             <a:pPr algn="ctr"/>
-            <a:endParaRPr lang="uk-UA"/>
+            <a:endParaRPr lang="uk-UA" dirty="0">
+              <a:latin typeface="Calibri" panose="020F0502020204030204" pitchFamily="34" charset="0"/>
+            </a:endParaRPr>
           </a:p>
         </p:txBody>
       </p:sp>
@@ -27888,14 +28559,20 @@
               <a:buNone/>
             </a:pPr>
             <a:r>
-              <a:rPr lang="uk-UA" sz="2400" dirty="0"/>
+              <a:rPr lang="uk-UA" sz="2400" dirty="0">
+                <a:latin typeface="Calibri" panose="020F0502020204030204" pitchFamily="34" charset="0"/>
+              </a:rPr>
               <a:t>Приклад перетворення рядкових значень до 0 і 1 у </a:t>
             </a:r>
             <a:r>
-              <a:rPr lang="en-US" sz="2400" dirty="0"/>
+              <a:rPr lang="en-US" sz="2400" dirty="0">
+                <a:latin typeface="Calibri" panose="020F0502020204030204" pitchFamily="34" charset="0"/>
+              </a:rPr>
               <a:t>R:</a:t>
             </a:r>
-            <a:endParaRPr lang="uk-UA" sz="2400" dirty="0"/>
+            <a:endParaRPr lang="uk-UA" sz="2400" dirty="0">
+              <a:latin typeface="Calibri" panose="020F0502020204030204" pitchFamily="34" charset="0"/>
+            </a:endParaRPr>
           </a:p>
         </p:txBody>
       </p:sp>

</xml_diff>